<commit_message>
:adhesive_bandage: Fix needless content
Add array elements compare chart
</commit_message>
<xml_diff>
--- a/05/yongki/DataStructure&FileSystem.pptx
+++ b/05/yongki/DataStructure&FileSystem.pptx
@@ -23,8 +23,8 @@
     <p:sldId id="307" r:id="rId14"/>
     <p:sldId id="308" r:id="rId15"/>
     <p:sldId id="309" r:id="rId16"/>
-    <p:sldId id="310" r:id="rId17"/>
-    <p:sldId id="311" r:id="rId18"/>
+    <p:sldId id="327" r:id="rId17"/>
+    <p:sldId id="310" r:id="rId18"/>
     <p:sldId id="312" r:id="rId19"/>
     <p:sldId id="313" r:id="rId20"/>
     <p:sldId id="324" r:id="rId21"/>
@@ -9470,7 +9470,7 @@
         <p:spPr bwMode="auto">
           <a:xfrm>
             <a:off x="457200" y="1360645"/>
-            <a:ext cx="8090656" cy="1015663"/>
+            <a:ext cx="8090656" cy="369332"/>
           </a:xfrm>
           <a:prstGeom prst="rect">
             <a:avLst/>
@@ -9656,102 +9656,7 @@
                 <a:latin typeface="맑은 고딕" panose="020B0503020000020004" pitchFamily="50" charset="-127"/>
                 <a:ea typeface="맑은 고딕" panose="020B0503020000020004" pitchFamily="50" charset="-127"/>
               </a:rPr>
-              <a:t>실생활에 적용하기</a:t>
-            </a:r>
-            <a:br>
-              <a:rPr lang="en-US" altLang="ko-KR" sz="1800" b="1" i="0">
-                <a:solidFill>
-                  <a:srgbClr val="24292F"/>
-                </a:solidFill>
-                <a:effectLst/>
-                <a:latin typeface="맑은 고딕" panose="020B0503020000020004" pitchFamily="50" charset="-127"/>
-                <a:ea typeface="맑은 고딕" panose="020B0503020000020004" pitchFamily="50" charset="-127"/>
-              </a:rPr>
-            </a:br>
-            <a:br>
-              <a:rPr lang="en-US" altLang="ko-KR" sz="1400" i="0">
-                <a:solidFill>
-                  <a:srgbClr val="24292F"/>
-                </a:solidFill>
-                <a:effectLst/>
-                <a:latin typeface="맑은 고딕" panose="020B0503020000020004" pitchFamily="50" charset="-127"/>
-                <a:ea typeface="맑은 고딕" panose="020B0503020000020004" pitchFamily="50" charset="-127"/>
-              </a:rPr>
-            </a:br>
-            <a:br>
-              <a:rPr lang="en-US" altLang="ko-KR" sz="1400" i="0">
-                <a:solidFill>
-                  <a:srgbClr val="24292F"/>
-                </a:solidFill>
-                <a:effectLst/>
-                <a:latin typeface="맑은 고딕" panose="020B0503020000020004" pitchFamily="50" charset="-127"/>
-                <a:ea typeface="맑은 고딕" panose="020B0503020000020004" pitchFamily="50" charset="-127"/>
-              </a:rPr>
-            </a:br>
-            <a:r>
-              <a:rPr lang="en-US" altLang="ko-KR" sz="1400" i="0">
-                <a:solidFill>
-                  <a:srgbClr val="24292F"/>
-                </a:solidFill>
-                <a:effectLst/>
-                <a:latin typeface="맑은 고딕" panose="020B0503020000020004" pitchFamily="50" charset="-127"/>
-                <a:ea typeface="맑은 고딕" panose="020B0503020000020004" pitchFamily="50" charset="-127"/>
-              </a:rPr>
-              <a:t>1. </a:t>
-            </a:r>
-            <a:r>
-              <a:rPr lang="ko-KR" altLang="en-US" sz="1400" i="0">
-                <a:solidFill>
-                  <a:srgbClr val="24292F"/>
-                </a:solidFill>
-                <a:effectLst/>
-                <a:latin typeface="맑은 고딕" panose="020B0503020000020004" pitchFamily="50" charset="-127"/>
-                <a:ea typeface="맑은 고딕" panose="020B0503020000020004" pitchFamily="50" charset="-127"/>
-              </a:rPr>
-              <a:t>구멍 생성을 방지하자</a:t>
-            </a:r>
-            <a:r>
-              <a:rPr lang="en-US" altLang="ko-KR" sz="1400" i="0">
-                <a:solidFill>
-                  <a:srgbClr val="24292F"/>
-                </a:solidFill>
-                <a:effectLst/>
-                <a:latin typeface="맑은 고딕" panose="020B0503020000020004" pitchFamily="50" charset="-127"/>
-                <a:ea typeface="맑은 고딕" panose="020B0503020000020004" pitchFamily="50" charset="-127"/>
-              </a:rPr>
-              <a:t>. (</a:t>
-            </a:r>
-            <a:r>
-              <a:rPr lang="ko-KR" altLang="en-US" sz="1400" i="0">
-                <a:solidFill>
-                  <a:srgbClr val="24292F"/>
-                </a:solidFill>
-                <a:effectLst/>
-                <a:latin typeface="맑은 고딕" panose="020B0503020000020004" pitchFamily="50" charset="-127"/>
-                <a:ea typeface="맑은 고딕" panose="020B0503020000020004" pitchFamily="50" charset="-127"/>
-              </a:rPr>
-              <a:t>앞에서 언급</a:t>
-            </a:r>
-            <a:r>
-              <a:rPr lang="en-US" altLang="ko-KR" sz="1400" i="0">
-                <a:solidFill>
-                  <a:srgbClr val="24292F"/>
-                </a:solidFill>
-                <a:effectLst/>
-                <a:latin typeface="맑은 고딕" panose="020B0503020000020004" pitchFamily="50" charset="-127"/>
-                <a:ea typeface="맑은 고딕" panose="020B0503020000020004" pitchFamily="50" charset="-127"/>
-              </a:rPr>
-              <a:t>)</a:t>
-            </a:r>
-            <a:r>
-              <a:rPr lang="en-US" altLang="ko-KR" sz="1400">
-                <a:solidFill>
-                  <a:srgbClr val="24292F"/>
-                </a:solidFill>
-                <a:latin typeface="맑은 고딕" panose="020B0503020000020004" pitchFamily="50" charset="-127"/>
-                <a:ea typeface="맑은 고딕" panose="020B0503020000020004" pitchFamily="50" charset="-127"/>
-              </a:rPr>
-              <a:t> </a:t>
+              <a:t>성능 비교</a:t>
             </a:r>
             <a:endParaRPr lang="ko-KR" altLang="en-US" sz="1400" i="0">
               <a:solidFill>
@@ -9808,6 +9713,427 @@
                 </a:solidFill>
               </a:rPr>
               <a:t>배열 내부 자료구조의 변형</a:t>
+            </a:r>
+            <a:endParaRPr lang="ko-KR" altLang="ko-KR" sz="2000">
+              <a:solidFill>
+                <a:schemeClr val="tx1"/>
+              </a:solidFill>
+            </a:endParaRPr>
+          </a:p>
+        </p:txBody>
+      </p:sp>
+      <p:cxnSp>
+        <p:nvCxnSpPr>
+          <p:cNvPr id="3" name="직선 연결선 2">
+            <a:extLst>
+              <a:ext uri="{FF2B5EF4-FFF2-40B4-BE49-F238E27FC236}">
+                <a16:creationId xmlns:a16="http://schemas.microsoft.com/office/drawing/2014/main" id="{00016A16-78F9-4CDB-B5A3-E7D1D56285D2}"/>
+              </a:ext>
+            </a:extLst>
+          </p:cNvPr>
+          <p:cNvCxnSpPr/>
+          <p:nvPr/>
+        </p:nvCxnSpPr>
+        <p:spPr bwMode="auto">
+          <a:xfrm>
+            <a:off x="575556" y="1268760"/>
+            <a:ext cx="7992888" cy="0"/>
+          </a:xfrm>
+          <a:prstGeom prst="line">
+            <a:avLst/>
+          </a:prstGeom>
+          <a:solidFill>
+            <a:schemeClr val="accent1"/>
+          </a:solidFill>
+          <a:ln w="25400" cap="flat" cmpd="sng" algn="ctr">
+            <a:solidFill>
+              <a:schemeClr val="tx1"/>
+            </a:solidFill>
+            <a:prstDash val="solid"/>
+            <a:round/>
+            <a:headEnd type="none" w="med" len="med"/>
+            <a:tailEnd type="none" w="med" len="med"/>
+          </a:ln>
+          <a:effectLst/>
+          <a:extLst>
+            <a:ext uri="{AF507438-7753-43E0-B8FC-AC1667EBCBE1}">
+              <a14:hiddenEffects xmlns:a14="http://schemas.microsoft.com/office/drawing/2010/main">
+                <a:effectLst>
+                  <a:outerShdw dist="35921" dir="2700000" algn="ctr" rotWithShape="0">
+                    <a:schemeClr val="bg2"/>
+                  </a:outerShdw>
+                </a:effectLst>
+              </a14:hiddenEffects>
+            </a:ext>
+          </a:extLst>
+        </p:spPr>
+      </p:cxnSp>
+      <p:pic>
+        <p:nvPicPr>
+          <p:cNvPr id="5" name="그림 4">
+            <a:extLst>
+              <a:ext uri="{FF2B5EF4-FFF2-40B4-BE49-F238E27FC236}">
+                <a16:creationId xmlns:a16="http://schemas.microsoft.com/office/drawing/2014/main" id="{B04D18AB-0D8E-402A-8588-F3592D61BA50}"/>
+              </a:ext>
+            </a:extLst>
+          </p:cNvPr>
+          <p:cNvPicPr>
+            <a:picLocks noChangeAspect="1"/>
+          </p:cNvPicPr>
+          <p:nvPr/>
+        </p:nvPicPr>
+        <p:blipFill>
+          <a:blip r:embed="rId2"/>
+          <a:stretch>
+            <a:fillRect/>
+          </a:stretch>
+        </p:blipFill>
+        <p:spPr>
+          <a:xfrm>
+            <a:off x="0" y="1932268"/>
+            <a:ext cx="9144000" cy="2993463"/>
+          </a:xfrm>
+          <a:prstGeom prst="rect">
+            <a:avLst/>
+          </a:prstGeom>
+        </p:spPr>
+      </p:pic>
+    </p:spTree>
+    <p:extLst>
+      <p:ext uri="{BB962C8B-B14F-4D97-AF65-F5344CB8AC3E}">
+        <p14:creationId xmlns:p14="http://schemas.microsoft.com/office/powerpoint/2010/main" val="2147037550"/>
+      </p:ext>
+    </p:extLst>
+  </p:cSld>
+  <p:clrMapOvr>
+    <a:masterClrMapping/>
+  </p:clrMapOvr>
+</p:sld>
+</file>
+
+<file path=ppt/slides/slide17.xml><?xml version="1.0" encoding="utf-8"?>
+<p:sld xmlns:a="http://schemas.openxmlformats.org/drawingml/2006/main" xmlns:r="http://schemas.openxmlformats.org/officeDocument/2006/relationships" xmlns:p="http://schemas.openxmlformats.org/presentationml/2006/main">
+  <p:cSld>
+    <p:spTree>
+      <p:nvGrpSpPr>
+        <p:cNvPr id="1" name=""/>
+        <p:cNvGrpSpPr/>
+        <p:nvPr/>
+      </p:nvGrpSpPr>
+      <p:grpSpPr>
+        <a:xfrm>
+          <a:off x="0" y="0"/>
+          <a:ext cx="0" cy="0"/>
+          <a:chOff x="0" y="0"/>
+          <a:chExt cx="0" cy="0"/>
+        </a:xfrm>
+      </p:grpSpPr>
+      <p:sp>
+        <p:nvSpPr>
+          <p:cNvPr id="10" name="TextBox 9">
+            <a:extLst>
+              <a:ext uri="{FF2B5EF4-FFF2-40B4-BE49-F238E27FC236}">
+                <a16:creationId xmlns:a16="http://schemas.microsoft.com/office/drawing/2014/main" id="{7DCB21BD-D9F7-42FE-BF95-F6125EB13B44}"/>
+              </a:ext>
+            </a:extLst>
+          </p:cNvPr>
+          <p:cNvSpPr txBox="1">
+            <a:spLocks noChangeArrowheads="1"/>
+          </p:cNvSpPr>
+          <p:nvPr/>
+        </p:nvSpPr>
+        <p:spPr bwMode="auto">
+          <a:xfrm>
+            <a:off x="457200" y="1360645"/>
+            <a:ext cx="8090656" cy="307777"/>
+          </a:xfrm>
+          <a:prstGeom prst="rect">
+            <a:avLst/>
+          </a:prstGeom>
+          <a:noFill/>
+          <a:ln>
+            <a:noFill/>
+          </a:ln>
+          <a:extLst>
+            <a:ext uri="{909E8E84-426E-40DD-AFC4-6F175D3DCCD1}">
+              <a14:hiddenFill xmlns:a14="http://schemas.microsoft.com/office/drawing/2010/main">
+                <a:solidFill>
+                  <a:srgbClr val="FFFFFF"/>
+                </a:solidFill>
+              </a14:hiddenFill>
+            </a:ext>
+            <a:ext uri="{91240B29-F687-4F45-9708-019B960494DF}">
+              <a14:hiddenLine xmlns:a14="http://schemas.microsoft.com/office/drawing/2010/main" w="9525">
+                <a:solidFill>
+                  <a:srgbClr val="000000"/>
+                </a:solidFill>
+                <a:miter lim="800000"/>
+                <a:headEnd/>
+                <a:tailEnd/>
+              </a14:hiddenLine>
+            </a:ext>
+          </a:extLst>
+        </p:spPr>
+        <p:txBody>
+          <a:bodyPr wrap="square">
+            <a:spAutoFit/>
+          </a:bodyPr>
+          <a:lstStyle>
+            <a:lvl1pPr>
+              <a:spcBef>
+                <a:spcPct val="20000"/>
+              </a:spcBef>
+              <a:buChar char="•"/>
+              <a:defRPr sz="3200">
+                <a:solidFill>
+                  <a:schemeClr val="tx1"/>
+                </a:solidFill>
+                <a:latin typeface="Arial" panose="020B0604020202020204" pitchFamily="34" charset="0"/>
+                <a:ea typeface="Arial Unicode MS" panose="020B0604020202020204" pitchFamily="50" charset="-127"/>
+                <a:cs typeface="Arial" panose="020B0604020202020204" pitchFamily="34" charset="0"/>
+              </a:defRPr>
+            </a:lvl1pPr>
+            <a:lvl2pPr marL="742950" indent="-285750">
+              <a:spcBef>
+                <a:spcPct val="20000"/>
+              </a:spcBef>
+              <a:buChar char="–"/>
+              <a:defRPr sz="2800">
+                <a:solidFill>
+                  <a:schemeClr val="tx1"/>
+                </a:solidFill>
+                <a:latin typeface="Arial" panose="020B0604020202020204" pitchFamily="34" charset="0"/>
+                <a:ea typeface="Arial Unicode MS" panose="020B0604020202020204" pitchFamily="50" charset="-127"/>
+                <a:cs typeface="Arial" panose="020B0604020202020204" pitchFamily="34" charset="0"/>
+              </a:defRPr>
+            </a:lvl2pPr>
+            <a:lvl3pPr marL="1143000" indent="-228600">
+              <a:spcBef>
+                <a:spcPct val="20000"/>
+              </a:spcBef>
+              <a:buChar char="•"/>
+              <a:defRPr sz="2400">
+                <a:solidFill>
+                  <a:schemeClr val="tx1"/>
+                </a:solidFill>
+                <a:latin typeface="Arial" panose="020B0604020202020204" pitchFamily="34" charset="0"/>
+                <a:ea typeface="Arial Unicode MS" panose="020B0604020202020204" pitchFamily="50" charset="-127"/>
+                <a:cs typeface="Arial" panose="020B0604020202020204" pitchFamily="34" charset="0"/>
+              </a:defRPr>
+            </a:lvl3pPr>
+            <a:lvl4pPr marL="1600200" indent="-228600">
+              <a:spcBef>
+                <a:spcPct val="20000"/>
+              </a:spcBef>
+              <a:buChar char="–"/>
+              <a:defRPr sz="2000">
+                <a:solidFill>
+                  <a:schemeClr val="tx1"/>
+                </a:solidFill>
+                <a:latin typeface="Arial" panose="020B0604020202020204" pitchFamily="34" charset="0"/>
+                <a:ea typeface="Arial Unicode MS" panose="020B0604020202020204" pitchFamily="50" charset="-127"/>
+                <a:cs typeface="Arial" panose="020B0604020202020204" pitchFamily="34" charset="0"/>
+              </a:defRPr>
+            </a:lvl4pPr>
+            <a:lvl5pPr marL="2057400" indent="-228600">
+              <a:spcBef>
+                <a:spcPct val="20000"/>
+              </a:spcBef>
+              <a:buChar char="»"/>
+              <a:defRPr sz="2000">
+                <a:solidFill>
+                  <a:schemeClr val="tx1"/>
+                </a:solidFill>
+                <a:latin typeface="Arial" panose="020B0604020202020204" pitchFamily="34" charset="0"/>
+                <a:ea typeface="Arial Unicode MS" panose="020B0604020202020204" pitchFamily="50" charset="-127"/>
+                <a:cs typeface="Arial" panose="020B0604020202020204" pitchFamily="34" charset="0"/>
+              </a:defRPr>
+            </a:lvl5pPr>
+            <a:lvl6pPr marL="2514600" indent="-228600" eaLnBrk="0" fontAlgn="base" hangingPunct="0">
+              <a:spcBef>
+                <a:spcPct val="20000"/>
+              </a:spcBef>
+              <a:spcAft>
+                <a:spcPct val="0"/>
+              </a:spcAft>
+              <a:buChar char="»"/>
+              <a:defRPr sz="2000">
+                <a:solidFill>
+                  <a:schemeClr val="tx1"/>
+                </a:solidFill>
+                <a:latin typeface="Arial" panose="020B0604020202020204" pitchFamily="34" charset="0"/>
+                <a:ea typeface="Arial Unicode MS" panose="020B0604020202020204" pitchFamily="50" charset="-127"/>
+                <a:cs typeface="Arial" panose="020B0604020202020204" pitchFamily="34" charset="0"/>
+              </a:defRPr>
+            </a:lvl6pPr>
+            <a:lvl7pPr marL="2971800" indent="-228600" eaLnBrk="0" fontAlgn="base" hangingPunct="0">
+              <a:spcBef>
+                <a:spcPct val="20000"/>
+              </a:spcBef>
+              <a:spcAft>
+                <a:spcPct val="0"/>
+              </a:spcAft>
+              <a:buChar char="»"/>
+              <a:defRPr sz="2000">
+                <a:solidFill>
+                  <a:schemeClr val="tx1"/>
+                </a:solidFill>
+                <a:latin typeface="Arial" panose="020B0604020202020204" pitchFamily="34" charset="0"/>
+                <a:ea typeface="Arial Unicode MS" panose="020B0604020202020204" pitchFamily="50" charset="-127"/>
+                <a:cs typeface="Arial" panose="020B0604020202020204" pitchFamily="34" charset="0"/>
+              </a:defRPr>
+            </a:lvl7pPr>
+            <a:lvl8pPr marL="3429000" indent="-228600" eaLnBrk="0" fontAlgn="base" hangingPunct="0">
+              <a:spcBef>
+                <a:spcPct val="20000"/>
+              </a:spcBef>
+              <a:spcAft>
+                <a:spcPct val="0"/>
+              </a:spcAft>
+              <a:buChar char="»"/>
+              <a:defRPr sz="2000">
+                <a:solidFill>
+                  <a:schemeClr val="tx1"/>
+                </a:solidFill>
+                <a:latin typeface="Arial" panose="020B0604020202020204" pitchFamily="34" charset="0"/>
+                <a:ea typeface="Arial Unicode MS" panose="020B0604020202020204" pitchFamily="50" charset="-127"/>
+                <a:cs typeface="Arial" panose="020B0604020202020204" pitchFamily="34" charset="0"/>
+              </a:defRPr>
+            </a:lvl8pPr>
+            <a:lvl9pPr marL="3886200" indent="-228600" eaLnBrk="0" fontAlgn="base" hangingPunct="0">
+              <a:spcBef>
+                <a:spcPct val="20000"/>
+              </a:spcBef>
+              <a:spcAft>
+                <a:spcPct val="0"/>
+              </a:spcAft>
+              <a:buChar char="»"/>
+              <a:defRPr sz="2000">
+                <a:solidFill>
+                  <a:schemeClr val="tx1"/>
+                </a:solidFill>
+                <a:latin typeface="Arial" panose="020B0604020202020204" pitchFamily="34" charset="0"/>
+                <a:ea typeface="Arial Unicode MS" panose="020B0604020202020204" pitchFamily="50" charset="-127"/>
+                <a:cs typeface="Arial" panose="020B0604020202020204" pitchFamily="34" charset="0"/>
+              </a:defRPr>
+            </a:lvl9pPr>
+          </a:lstStyle>
+          <a:p>
+            <a:pPr algn="l">
+              <a:buNone/>
+            </a:pPr>
+            <a:r>
+              <a:rPr lang="en-US" altLang="ko-KR" sz="1400" i="0">
+                <a:solidFill>
+                  <a:srgbClr val="24292F"/>
+                </a:solidFill>
+                <a:effectLst/>
+                <a:latin typeface="맑은 고딕" panose="020B0503020000020004" pitchFamily="50" charset="-127"/>
+                <a:ea typeface="맑은 고딕" panose="020B0503020000020004" pitchFamily="50" charset="-127"/>
+              </a:rPr>
+              <a:t>1. </a:t>
+            </a:r>
+            <a:r>
+              <a:rPr lang="ko-KR" altLang="en-US" sz="1400" i="0">
+                <a:solidFill>
+                  <a:srgbClr val="24292F"/>
+                </a:solidFill>
+                <a:effectLst/>
+                <a:latin typeface="맑은 고딕" panose="020B0503020000020004" pitchFamily="50" charset="-127"/>
+                <a:ea typeface="맑은 고딕" panose="020B0503020000020004" pitchFamily="50" charset="-127"/>
+              </a:rPr>
+              <a:t>구멍 생성을 방지하자</a:t>
+            </a:r>
+            <a:r>
+              <a:rPr lang="en-US" altLang="ko-KR" sz="1400" i="0">
+                <a:solidFill>
+                  <a:srgbClr val="24292F"/>
+                </a:solidFill>
+                <a:effectLst/>
+                <a:latin typeface="맑은 고딕" panose="020B0503020000020004" pitchFamily="50" charset="-127"/>
+                <a:ea typeface="맑은 고딕" panose="020B0503020000020004" pitchFamily="50" charset="-127"/>
+              </a:rPr>
+              <a:t>. (</a:t>
+            </a:r>
+            <a:r>
+              <a:rPr lang="ko-KR" altLang="en-US" sz="1400" i="0">
+                <a:solidFill>
+                  <a:srgbClr val="24292F"/>
+                </a:solidFill>
+                <a:effectLst/>
+                <a:latin typeface="맑은 고딕" panose="020B0503020000020004" pitchFamily="50" charset="-127"/>
+                <a:ea typeface="맑은 고딕" panose="020B0503020000020004" pitchFamily="50" charset="-127"/>
+              </a:rPr>
+              <a:t>앞에서 언급</a:t>
+            </a:r>
+            <a:r>
+              <a:rPr lang="en-US" altLang="ko-KR" sz="1400" i="0">
+                <a:solidFill>
+                  <a:srgbClr val="24292F"/>
+                </a:solidFill>
+                <a:effectLst/>
+                <a:latin typeface="맑은 고딕" panose="020B0503020000020004" pitchFamily="50" charset="-127"/>
+                <a:ea typeface="맑은 고딕" panose="020B0503020000020004" pitchFamily="50" charset="-127"/>
+              </a:rPr>
+              <a:t>)</a:t>
+            </a:r>
+            <a:r>
+              <a:rPr lang="en-US" altLang="ko-KR" sz="1400">
+                <a:solidFill>
+                  <a:srgbClr val="24292F"/>
+                </a:solidFill>
+                <a:latin typeface="맑은 고딕" panose="020B0503020000020004" pitchFamily="50" charset="-127"/>
+                <a:ea typeface="맑은 고딕" panose="020B0503020000020004" pitchFamily="50" charset="-127"/>
+              </a:rPr>
+              <a:t> </a:t>
+            </a:r>
+            <a:endParaRPr lang="ko-KR" altLang="en-US" sz="1400" i="0">
+              <a:solidFill>
+                <a:srgbClr val="24292F"/>
+              </a:solidFill>
+              <a:effectLst/>
+              <a:latin typeface="맑은 고딕" panose="020B0503020000020004" pitchFamily="50" charset="-127"/>
+              <a:ea typeface="맑은 고딕" panose="020B0503020000020004" pitchFamily="50" charset="-127"/>
+            </a:endParaRPr>
+          </a:p>
+        </p:txBody>
+      </p:sp>
+      <p:sp>
+        <p:nvSpPr>
+          <p:cNvPr id="5122" name="Rectangle 2">
+            <a:extLst>
+              <a:ext uri="{FF2B5EF4-FFF2-40B4-BE49-F238E27FC236}">
+                <a16:creationId xmlns:a16="http://schemas.microsoft.com/office/drawing/2014/main" id="{5A5441BC-21C9-4C4E-8617-73A39EC832C7}"/>
+              </a:ext>
+            </a:extLst>
+          </p:cNvPr>
+          <p:cNvSpPr>
+            <a:spLocks noGrp="1" noChangeArrowheads="1"/>
+          </p:cNvSpPr>
+          <p:nvPr>
+            <p:ph type="title"/>
+          </p:nvPr>
+        </p:nvSpPr>
+        <p:spPr>
+          <a:xfrm>
+            <a:off x="457200" y="188913"/>
+            <a:ext cx="8229600" cy="1295400"/>
+          </a:xfrm>
+        </p:spPr>
+        <p:txBody>
+          <a:bodyPr/>
+          <a:lstStyle/>
+          <a:p>
+            <a:pPr algn="l" eaLnBrk="1" hangingPunct="1">
+              <a:defRPr/>
+            </a:pPr>
+            <a:r>
+              <a:rPr lang="ko-KR" altLang="en-US" sz="3200">
+                <a:solidFill>
+                  <a:schemeClr val="tx1"/>
+                </a:solidFill>
+              </a:rPr>
+              <a:t>실생활에 적용하기</a:t>
             </a:r>
             <a:endParaRPr lang="ko-KR" altLang="ko-KR" sz="2000">
               <a:solidFill>
@@ -9885,284 +10211,14 @@
         </p:blipFill>
         <p:spPr>
           <a:xfrm>
-            <a:off x="575556" y="4832365"/>
-            <a:ext cx="4392488" cy="1695759"/>
+            <a:off x="761028" y="1992270"/>
+            <a:ext cx="3870132" cy="1494099"/>
           </a:xfrm>
           <a:prstGeom prst="rect">
             <a:avLst/>
           </a:prstGeom>
         </p:spPr>
       </p:pic>
-      <p:pic>
-        <p:nvPicPr>
-          <p:cNvPr id="7" name="그림 6">
-            <a:extLst>
-              <a:ext uri="{FF2B5EF4-FFF2-40B4-BE49-F238E27FC236}">
-                <a16:creationId xmlns:a16="http://schemas.microsoft.com/office/drawing/2014/main" id="{2FB964C8-850B-4AEF-B64D-9D4792258D58}"/>
-              </a:ext>
-            </a:extLst>
-          </p:cNvPr>
-          <p:cNvPicPr>
-            <a:picLocks noChangeAspect="1"/>
-          </p:cNvPicPr>
-          <p:nvPr/>
-        </p:nvPicPr>
-        <p:blipFill>
-          <a:blip r:embed="rId3"/>
-          <a:stretch>
-            <a:fillRect/>
-          </a:stretch>
-        </p:blipFill>
-        <p:spPr>
-          <a:xfrm>
-            <a:off x="575556" y="2941991"/>
-            <a:ext cx="3112243" cy="629859"/>
-          </a:xfrm>
-          <a:prstGeom prst="rect">
-            <a:avLst/>
-          </a:prstGeom>
-        </p:spPr>
-      </p:pic>
-      <p:sp>
-        <p:nvSpPr>
-          <p:cNvPr id="11" name="TextBox 10">
-            <a:extLst>
-              <a:ext uri="{FF2B5EF4-FFF2-40B4-BE49-F238E27FC236}">
-                <a16:creationId xmlns:a16="http://schemas.microsoft.com/office/drawing/2014/main" id="{5C16AB56-732F-4BDA-85BF-151DE6004367}"/>
-              </a:ext>
-            </a:extLst>
-          </p:cNvPr>
-          <p:cNvSpPr txBox="1">
-            <a:spLocks noChangeArrowheads="1"/>
-          </p:cNvSpPr>
-          <p:nvPr/>
-        </p:nvSpPr>
-        <p:spPr bwMode="auto">
-          <a:xfrm>
-            <a:off x="6228184" y="3107935"/>
-            <a:ext cx="1944216" cy="307777"/>
-          </a:xfrm>
-          <a:prstGeom prst="rect">
-            <a:avLst/>
-          </a:prstGeom>
-          <a:noFill/>
-          <a:ln>
-            <a:noFill/>
-          </a:ln>
-          <a:extLst>
-            <a:ext uri="{909E8E84-426E-40DD-AFC4-6F175D3DCCD1}">
-              <a14:hiddenFill xmlns:a14="http://schemas.microsoft.com/office/drawing/2010/main">
-                <a:solidFill>
-                  <a:srgbClr val="FFFFFF"/>
-                </a:solidFill>
-              </a14:hiddenFill>
-            </a:ext>
-            <a:ext uri="{91240B29-F687-4F45-9708-019B960494DF}">
-              <a14:hiddenLine xmlns:a14="http://schemas.microsoft.com/office/drawing/2010/main" w="9525">
-                <a:solidFill>
-                  <a:srgbClr val="000000"/>
-                </a:solidFill>
-                <a:miter lim="800000"/>
-                <a:headEnd/>
-                <a:tailEnd/>
-              </a14:hiddenLine>
-            </a:ext>
-          </a:extLst>
-        </p:spPr>
-        <p:txBody>
-          <a:bodyPr wrap="square">
-            <a:spAutoFit/>
-          </a:bodyPr>
-          <a:lstStyle>
-            <a:lvl1pPr>
-              <a:spcBef>
-                <a:spcPct val="20000"/>
-              </a:spcBef>
-              <a:buChar char="•"/>
-              <a:defRPr sz="3200">
-                <a:solidFill>
-                  <a:schemeClr val="tx1"/>
-                </a:solidFill>
-                <a:latin typeface="Arial" panose="020B0604020202020204" pitchFamily="34" charset="0"/>
-                <a:ea typeface="Arial Unicode MS" panose="020B0604020202020204" pitchFamily="50" charset="-127"/>
-                <a:cs typeface="Arial" panose="020B0604020202020204" pitchFamily="34" charset="0"/>
-              </a:defRPr>
-            </a:lvl1pPr>
-            <a:lvl2pPr marL="742950" indent="-285750">
-              <a:spcBef>
-                <a:spcPct val="20000"/>
-              </a:spcBef>
-              <a:buChar char="–"/>
-              <a:defRPr sz="2800">
-                <a:solidFill>
-                  <a:schemeClr val="tx1"/>
-                </a:solidFill>
-                <a:latin typeface="Arial" panose="020B0604020202020204" pitchFamily="34" charset="0"/>
-                <a:ea typeface="Arial Unicode MS" panose="020B0604020202020204" pitchFamily="50" charset="-127"/>
-                <a:cs typeface="Arial" panose="020B0604020202020204" pitchFamily="34" charset="0"/>
-              </a:defRPr>
-            </a:lvl2pPr>
-            <a:lvl3pPr marL="1143000" indent="-228600">
-              <a:spcBef>
-                <a:spcPct val="20000"/>
-              </a:spcBef>
-              <a:buChar char="•"/>
-              <a:defRPr sz="2400">
-                <a:solidFill>
-                  <a:schemeClr val="tx1"/>
-                </a:solidFill>
-                <a:latin typeface="Arial" panose="020B0604020202020204" pitchFamily="34" charset="0"/>
-                <a:ea typeface="Arial Unicode MS" panose="020B0604020202020204" pitchFamily="50" charset="-127"/>
-                <a:cs typeface="Arial" panose="020B0604020202020204" pitchFamily="34" charset="0"/>
-              </a:defRPr>
-            </a:lvl3pPr>
-            <a:lvl4pPr marL="1600200" indent="-228600">
-              <a:spcBef>
-                <a:spcPct val="20000"/>
-              </a:spcBef>
-              <a:buChar char="–"/>
-              <a:defRPr sz="2000">
-                <a:solidFill>
-                  <a:schemeClr val="tx1"/>
-                </a:solidFill>
-                <a:latin typeface="Arial" panose="020B0604020202020204" pitchFamily="34" charset="0"/>
-                <a:ea typeface="Arial Unicode MS" panose="020B0604020202020204" pitchFamily="50" charset="-127"/>
-                <a:cs typeface="Arial" panose="020B0604020202020204" pitchFamily="34" charset="0"/>
-              </a:defRPr>
-            </a:lvl4pPr>
-            <a:lvl5pPr marL="2057400" indent="-228600">
-              <a:spcBef>
-                <a:spcPct val="20000"/>
-              </a:spcBef>
-              <a:buChar char="»"/>
-              <a:defRPr sz="2000">
-                <a:solidFill>
-                  <a:schemeClr val="tx1"/>
-                </a:solidFill>
-                <a:latin typeface="Arial" panose="020B0604020202020204" pitchFamily="34" charset="0"/>
-                <a:ea typeface="Arial Unicode MS" panose="020B0604020202020204" pitchFamily="50" charset="-127"/>
-                <a:cs typeface="Arial" panose="020B0604020202020204" pitchFamily="34" charset="0"/>
-              </a:defRPr>
-            </a:lvl5pPr>
-            <a:lvl6pPr marL="2514600" indent="-228600" eaLnBrk="0" fontAlgn="base" hangingPunct="0">
-              <a:spcBef>
-                <a:spcPct val="20000"/>
-              </a:spcBef>
-              <a:spcAft>
-                <a:spcPct val="0"/>
-              </a:spcAft>
-              <a:buChar char="»"/>
-              <a:defRPr sz="2000">
-                <a:solidFill>
-                  <a:schemeClr val="tx1"/>
-                </a:solidFill>
-                <a:latin typeface="Arial" panose="020B0604020202020204" pitchFamily="34" charset="0"/>
-                <a:ea typeface="Arial Unicode MS" panose="020B0604020202020204" pitchFamily="50" charset="-127"/>
-                <a:cs typeface="Arial" panose="020B0604020202020204" pitchFamily="34" charset="0"/>
-              </a:defRPr>
-            </a:lvl6pPr>
-            <a:lvl7pPr marL="2971800" indent="-228600" eaLnBrk="0" fontAlgn="base" hangingPunct="0">
-              <a:spcBef>
-                <a:spcPct val="20000"/>
-              </a:spcBef>
-              <a:spcAft>
-                <a:spcPct val="0"/>
-              </a:spcAft>
-              <a:buChar char="»"/>
-              <a:defRPr sz="2000">
-                <a:solidFill>
-                  <a:schemeClr val="tx1"/>
-                </a:solidFill>
-                <a:latin typeface="Arial" panose="020B0604020202020204" pitchFamily="34" charset="0"/>
-                <a:ea typeface="Arial Unicode MS" panose="020B0604020202020204" pitchFamily="50" charset="-127"/>
-                <a:cs typeface="Arial" panose="020B0604020202020204" pitchFamily="34" charset="0"/>
-              </a:defRPr>
-            </a:lvl7pPr>
-            <a:lvl8pPr marL="3429000" indent="-228600" eaLnBrk="0" fontAlgn="base" hangingPunct="0">
-              <a:spcBef>
-                <a:spcPct val="20000"/>
-              </a:spcBef>
-              <a:spcAft>
-                <a:spcPct val="0"/>
-              </a:spcAft>
-              <a:buChar char="»"/>
-              <a:defRPr sz="2000">
-                <a:solidFill>
-                  <a:schemeClr val="tx1"/>
-                </a:solidFill>
-                <a:latin typeface="Arial" panose="020B0604020202020204" pitchFamily="34" charset="0"/>
-                <a:ea typeface="Arial Unicode MS" panose="020B0604020202020204" pitchFamily="50" charset="-127"/>
-                <a:cs typeface="Arial" panose="020B0604020202020204" pitchFamily="34" charset="0"/>
-              </a:defRPr>
-            </a:lvl8pPr>
-            <a:lvl9pPr marL="3886200" indent="-228600" eaLnBrk="0" fontAlgn="base" hangingPunct="0">
-              <a:spcBef>
-                <a:spcPct val="20000"/>
-              </a:spcBef>
-              <a:spcAft>
-                <a:spcPct val="0"/>
-              </a:spcAft>
-              <a:buChar char="»"/>
-              <a:defRPr sz="2000">
-                <a:solidFill>
-                  <a:schemeClr val="tx1"/>
-                </a:solidFill>
-                <a:latin typeface="Arial" panose="020B0604020202020204" pitchFamily="34" charset="0"/>
-                <a:ea typeface="Arial Unicode MS" panose="020B0604020202020204" pitchFamily="50" charset="-127"/>
-                <a:cs typeface="Arial" panose="020B0604020202020204" pitchFamily="34" charset="0"/>
-              </a:defRPr>
-            </a:lvl9pPr>
-          </a:lstStyle>
-          <a:p>
-            <a:pPr algn="l">
-              <a:buNone/>
-            </a:pPr>
-            <a:r>
-              <a:rPr lang="en-US" altLang="ko-KR" sz="1400" i="0">
-                <a:solidFill>
-                  <a:srgbClr val="24292F"/>
-                </a:solidFill>
-                <a:effectLst/>
-                <a:latin typeface="맑은 고딕" panose="020B0503020000020004" pitchFamily="50" charset="-127"/>
-                <a:ea typeface="맑은 고딕" panose="020B0503020000020004" pitchFamily="50" charset="-127"/>
-              </a:rPr>
-              <a:t>for-of</a:t>
-            </a:r>
-            <a:r>
-              <a:rPr lang="ko-KR" altLang="en-US" sz="1400">
-                <a:solidFill>
-                  <a:srgbClr val="24292F"/>
-                </a:solidFill>
-                <a:latin typeface="맑은 고딕" panose="020B0503020000020004" pitchFamily="50" charset="-127"/>
-                <a:ea typeface="맑은 고딕" panose="020B0503020000020004" pitchFamily="50" charset="-127"/>
-              </a:rPr>
-              <a:t>나 </a:t>
-            </a:r>
-            <a:r>
-              <a:rPr lang="en-US" altLang="ko-KR" sz="1400" i="0">
-                <a:solidFill>
-                  <a:srgbClr val="24292F"/>
-                </a:solidFill>
-                <a:effectLst/>
-                <a:latin typeface="맑은 고딕" panose="020B0503020000020004" pitchFamily="50" charset="-127"/>
-                <a:ea typeface="맑은 고딕" panose="020B0503020000020004" pitchFamily="50" charset="-127"/>
-              </a:rPr>
-              <a:t>forEach </a:t>
-            </a:r>
-            <a:r>
-              <a:rPr lang="ko-KR" altLang="en-US" sz="1400" i="0">
-                <a:solidFill>
-                  <a:srgbClr val="24292F"/>
-                </a:solidFill>
-                <a:effectLst/>
-                <a:latin typeface="맑은 고딕" panose="020B0503020000020004" pitchFamily="50" charset="-127"/>
-                <a:ea typeface="맑은 고딕" panose="020B0503020000020004" pitchFamily="50" charset="-127"/>
-              </a:rPr>
-              <a:t>사용</a:t>
-            </a:r>
-          </a:p>
-        </p:txBody>
-      </p:sp>
       <p:sp>
         <p:nvSpPr>
           <p:cNvPr id="12" name="TextBox 11">
@@ -10179,7 +10235,7 @@
         </p:nvSpPr>
         <p:spPr bwMode="auto">
           <a:xfrm>
-            <a:off x="6228184" y="5435351"/>
+            <a:off x="5940152" y="2535996"/>
             <a:ext cx="1944216" cy="523220"/>
           </a:xfrm>
           <a:prstGeom prst="rect">
@@ -10411,45 +10467,6 @@
           </a:p>
         </p:txBody>
       </p:sp>
-      <p:pic>
-        <p:nvPicPr>
-          <p:cNvPr id="9" name="그래픽 8" descr="오른쪽 화살표 단색으로 채워진">
-            <a:extLst>
-              <a:ext uri="{FF2B5EF4-FFF2-40B4-BE49-F238E27FC236}">
-                <a16:creationId xmlns:a16="http://schemas.microsoft.com/office/drawing/2014/main" id="{111CE83E-D82D-4B0F-9286-01E08456E0DB}"/>
-              </a:ext>
-            </a:extLst>
-          </p:cNvPr>
-          <p:cNvPicPr>
-            <a:picLocks noChangeAspect="1"/>
-          </p:cNvPicPr>
-          <p:nvPr/>
-        </p:nvPicPr>
-        <p:blipFill>
-          <a:blip r:embed="rId4">
-            <a:extLst>
-              <a:ext uri="{28A0092B-C50C-407E-A947-70E740481C1C}">
-                <a14:useLocalDpi xmlns:a14="http://schemas.microsoft.com/office/drawing/2010/main" val="0"/>
-              </a:ext>
-              <a:ext uri="{96DAC541-7B7A-43D3-8B79-37D633B846F1}">
-                <asvg:svgBlip xmlns:asvg="http://schemas.microsoft.com/office/drawing/2016/SVG/main" r:embed="rId5"/>
-              </a:ext>
-            </a:extLst>
-          </a:blip>
-          <a:stretch>
-            <a:fillRect/>
-          </a:stretch>
-        </p:blipFill>
-        <p:spPr>
-          <a:xfrm>
-            <a:off x="4283968" y="2753234"/>
-            <a:ext cx="914400" cy="914400"/>
-          </a:xfrm>
-          <a:prstGeom prst="rect">
-            <a:avLst/>
-          </a:prstGeom>
-        </p:spPr>
-      </p:pic>
       <p:pic>
         <p:nvPicPr>
           <p:cNvPr id="14" name="그래픽 13" descr="오른쪽 화살표 단색으로 채워진">
@@ -10465,13 +10482,13 @@
           <p:nvPr/>
         </p:nvPicPr>
         <p:blipFill>
-          <a:blip r:embed="rId4">
+          <a:blip r:embed="rId3">
             <a:extLst>
               <a:ext uri="{28A0092B-C50C-407E-A947-70E740481C1C}">
                 <a14:useLocalDpi xmlns:a14="http://schemas.microsoft.com/office/drawing/2010/main" val="0"/>
               </a:ext>
               <a:ext uri="{96DAC541-7B7A-43D3-8B79-37D633B846F1}">
-                <asvg:svgBlip xmlns:asvg="http://schemas.microsoft.com/office/drawing/2016/SVG/main" r:embed="rId5"/>
+                <asvg:svgBlip xmlns:asvg="http://schemas.microsoft.com/office/drawing/2016/SVG/main" r:embed="rId4"/>
               </a:ext>
             </a:extLst>
           </a:blip>
@@ -10481,7 +10498,7 @@
         </p:blipFill>
         <p:spPr>
           <a:xfrm>
-            <a:off x="5087536" y="5186886"/>
+            <a:off x="4799504" y="2287531"/>
             <a:ext cx="914400" cy="914400"/>
           </a:xfrm>
           <a:prstGeom prst="rect">
@@ -10505,7 +10522,7 @@
         </p:nvSpPr>
         <p:spPr bwMode="auto">
           <a:xfrm>
-            <a:off x="446956" y="4452233"/>
+            <a:off x="446956" y="1684493"/>
             <a:ext cx="8090656" cy="307777"/>
           </a:xfrm>
           <a:prstGeom prst="rect">
@@ -10691,7 +10708,7 @@
                 <a:latin typeface="맑은 고딕" panose="020B0503020000020004" pitchFamily="50" charset="-127"/>
                 <a:ea typeface="맑은 고딕" panose="020B0503020000020004" pitchFamily="50" charset="-127"/>
               </a:rPr>
-              <a:t>3. </a:t>
+              <a:t>2. </a:t>
             </a:r>
             <a:r>
               <a:rPr lang="ko-KR" altLang="en-US" sz="1400">
@@ -10726,10 +10743,10 @@
       </p:sp>
       <p:sp>
         <p:nvSpPr>
-          <p:cNvPr id="16" name="TextBox 15">
+          <p:cNvPr id="13" name="TextBox 12">
             <a:extLst>
               <a:ext uri="{FF2B5EF4-FFF2-40B4-BE49-F238E27FC236}">
-                <a16:creationId xmlns:a16="http://schemas.microsoft.com/office/drawing/2014/main" id="{C88209AA-73B4-4E65-B3C2-B3BA4988AD1B}"/>
+                <a16:creationId xmlns:a16="http://schemas.microsoft.com/office/drawing/2014/main" id="{2DBD0803-6583-4526-A45C-F42FF168ED11}"/>
               </a:ext>
             </a:extLst>
           </p:cNvPr>
@@ -10740,8 +10757,8 @@
         </p:nvSpPr>
         <p:spPr bwMode="auto">
           <a:xfrm>
-            <a:off x="451520" y="2538602"/>
-            <a:ext cx="8090656" cy="307777"/>
+            <a:off x="462916" y="3558274"/>
+            <a:ext cx="8090656" cy="566309"/>
           </a:xfrm>
           <a:prstGeom prst="rect">
             <a:avLst/>
@@ -10926,7 +10943,77 @@
                 <a:latin typeface="맑은 고딕" panose="020B0503020000020004" pitchFamily="50" charset="-127"/>
                 <a:ea typeface="맑은 고딕" panose="020B0503020000020004" pitchFamily="50" charset="-127"/>
               </a:rPr>
-              <a:t>2. </a:t>
+              <a:t>3</a:t>
+            </a:r>
+            <a:r>
+              <a:rPr lang="en-US" altLang="ko-KR" sz="1400" i="0">
+                <a:solidFill>
+                  <a:srgbClr val="24292F"/>
+                </a:solidFill>
+                <a:effectLst/>
+                <a:latin typeface="맑은 고딕" panose="020B0503020000020004" pitchFamily="50" charset="-127"/>
+                <a:ea typeface="맑은 고딕" panose="020B0503020000020004" pitchFamily="50" charset="-127"/>
+              </a:rPr>
+              <a:t>. </a:t>
+            </a:r>
+            <a:r>
+              <a:rPr lang="ko-KR" altLang="en-US" sz="1400" i="0">
+                <a:solidFill>
+                  <a:srgbClr val="24292F"/>
+                </a:solidFill>
+                <a:effectLst/>
+                <a:latin typeface="맑은 고딕" panose="020B0503020000020004" pitchFamily="50" charset="-127"/>
+                <a:ea typeface="맑은 고딕" panose="020B0503020000020004" pitchFamily="50" charset="-127"/>
+              </a:rPr>
+              <a:t>다형성 </a:t>
+            </a:r>
+            <a:r>
+              <a:rPr lang="en-US" altLang="ko-KR" sz="1400" i="0">
+                <a:solidFill>
+                  <a:srgbClr val="24292F"/>
+                </a:solidFill>
+                <a:effectLst/>
+                <a:latin typeface="맑은 고딕" panose="020B0503020000020004" pitchFamily="50" charset="-127"/>
+                <a:ea typeface="맑은 고딕" panose="020B0503020000020004" pitchFamily="50" charset="-127"/>
+              </a:rPr>
+              <a:t>(call site polymorphism)</a:t>
+            </a:r>
+            <a:r>
+              <a:rPr lang="ko-KR" altLang="en-US" sz="1400" i="0">
+                <a:solidFill>
+                  <a:srgbClr val="24292F"/>
+                </a:solidFill>
+                <a:effectLst/>
+                <a:latin typeface="맑은 고딕" panose="020B0503020000020004" pitchFamily="50" charset="-127"/>
+                <a:ea typeface="맑은 고딕" panose="020B0503020000020004" pitchFamily="50" charset="-127"/>
+              </a:rPr>
+              <a:t>을 피하자</a:t>
+            </a:r>
+            <a:r>
+              <a:rPr lang="en-US" altLang="ko-KR" sz="1400" i="0">
+                <a:solidFill>
+                  <a:srgbClr val="24292F"/>
+                </a:solidFill>
+                <a:effectLst/>
+                <a:latin typeface="맑은 고딕" panose="020B0503020000020004" pitchFamily="50" charset="-127"/>
+                <a:ea typeface="맑은 고딕" panose="020B0503020000020004" pitchFamily="50" charset="-127"/>
+              </a:rPr>
+              <a:t>.</a:t>
+            </a:r>
+          </a:p>
+          <a:p>
+            <a:pPr algn="l">
+              <a:buNone/>
+            </a:pPr>
+            <a:r>
+              <a:rPr lang="en-US" altLang="ko-KR" sz="1400">
+                <a:solidFill>
+                  <a:srgbClr val="24292F"/>
+                </a:solidFill>
+                <a:latin typeface="맑은 고딕" panose="020B0503020000020004" pitchFamily="50" charset="-127"/>
+                <a:ea typeface="맑은 고딕" panose="020B0503020000020004" pitchFamily="50" charset="-127"/>
+              </a:rPr>
+              <a:t>   </a:t>
             </a:r>
             <a:r>
               <a:rPr lang="ko-KR" altLang="en-US" sz="1400">
@@ -10936,7 +11023,7 @@
                 <a:latin typeface="맑은 고딕" panose="020B0503020000020004" pitchFamily="50" charset="-127"/>
                 <a:ea typeface="맑은 고딕" panose="020B0503020000020004" pitchFamily="50" charset="-127"/>
               </a:rPr>
-              <a:t>배열의 길이를 초과하여 읽지 말자</a:t>
+              <a:t>배열 빌트인 메서드는 요소가 같은 배열 요소를 처리할 때 인라인 캐싱이 더 빠르다</a:t>
             </a:r>
             <a:r>
               <a:rPr lang="en-US" altLang="ko-KR" sz="1400">
@@ -10946,7 +11033,7 @@
                 <a:latin typeface="맑은 고딕" panose="020B0503020000020004" pitchFamily="50" charset="-127"/>
                 <a:ea typeface="맑은 고딕" panose="020B0503020000020004" pitchFamily="50" charset="-127"/>
               </a:rPr>
-              <a:t>. </a:t>
+              <a:t>.</a:t>
             </a:r>
             <a:endParaRPr lang="ko-KR" altLang="en-US" sz="1400" i="0">
               <a:solidFill>
@@ -10959,6 +11046,307 @@
           </a:p>
         </p:txBody>
       </p:sp>
+      <p:sp>
+        <p:nvSpPr>
+          <p:cNvPr id="18" name="TextBox 17">
+            <a:extLst>
+              <a:ext uri="{FF2B5EF4-FFF2-40B4-BE49-F238E27FC236}">
+                <a16:creationId xmlns:a16="http://schemas.microsoft.com/office/drawing/2014/main" id="{3666BD08-F6BB-4EFA-8EC2-CB1D004E47B0}"/>
+              </a:ext>
+            </a:extLst>
+          </p:cNvPr>
+          <p:cNvSpPr txBox="1">
+            <a:spLocks noChangeArrowheads="1"/>
+          </p:cNvSpPr>
+          <p:nvPr/>
+        </p:nvSpPr>
+        <p:spPr bwMode="auto">
+          <a:xfrm>
+            <a:off x="0" y="5836246"/>
+            <a:ext cx="8090656" cy="1015663"/>
+          </a:xfrm>
+          <a:prstGeom prst="rect">
+            <a:avLst/>
+          </a:prstGeom>
+          <a:noFill/>
+          <a:ln>
+            <a:noFill/>
+          </a:ln>
+          <a:extLst>
+            <a:ext uri="{909E8E84-426E-40DD-AFC4-6F175D3DCCD1}">
+              <a14:hiddenFill xmlns:a14="http://schemas.microsoft.com/office/drawing/2010/main">
+                <a:solidFill>
+                  <a:srgbClr val="FFFFFF"/>
+                </a:solidFill>
+              </a14:hiddenFill>
+            </a:ext>
+            <a:ext uri="{91240B29-F687-4F45-9708-019B960494DF}">
+              <a14:hiddenLine xmlns:a14="http://schemas.microsoft.com/office/drawing/2010/main" w="9525">
+                <a:solidFill>
+                  <a:srgbClr val="000000"/>
+                </a:solidFill>
+                <a:miter lim="800000"/>
+                <a:headEnd/>
+                <a:tailEnd/>
+              </a14:hiddenLine>
+            </a:ext>
+          </a:extLst>
+        </p:spPr>
+        <p:txBody>
+          <a:bodyPr wrap="square">
+            <a:spAutoFit/>
+          </a:bodyPr>
+          <a:lstStyle>
+            <a:lvl1pPr>
+              <a:spcBef>
+                <a:spcPct val="20000"/>
+              </a:spcBef>
+              <a:buChar char="•"/>
+              <a:defRPr sz="3200">
+                <a:solidFill>
+                  <a:schemeClr val="tx1"/>
+                </a:solidFill>
+                <a:latin typeface="Arial" panose="020B0604020202020204" pitchFamily="34" charset="0"/>
+                <a:ea typeface="Arial Unicode MS" panose="020B0604020202020204" pitchFamily="50" charset="-127"/>
+                <a:cs typeface="Arial" panose="020B0604020202020204" pitchFamily="34" charset="0"/>
+              </a:defRPr>
+            </a:lvl1pPr>
+            <a:lvl2pPr marL="742950" indent="-285750">
+              <a:spcBef>
+                <a:spcPct val="20000"/>
+              </a:spcBef>
+              <a:buChar char="–"/>
+              <a:defRPr sz="2800">
+                <a:solidFill>
+                  <a:schemeClr val="tx1"/>
+                </a:solidFill>
+                <a:latin typeface="Arial" panose="020B0604020202020204" pitchFamily="34" charset="0"/>
+                <a:ea typeface="Arial Unicode MS" panose="020B0604020202020204" pitchFamily="50" charset="-127"/>
+                <a:cs typeface="Arial" panose="020B0604020202020204" pitchFamily="34" charset="0"/>
+              </a:defRPr>
+            </a:lvl2pPr>
+            <a:lvl3pPr marL="1143000" indent="-228600">
+              <a:spcBef>
+                <a:spcPct val="20000"/>
+              </a:spcBef>
+              <a:buChar char="•"/>
+              <a:defRPr sz="2400">
+                <a:solidFill>
+                  <a:schemeClr val="tx1"/>
+                </a:solidFill>
+                <a:latin typeface="Arial" panose="020B0604020202020204" pitchFamily="34" charset="0"/>
+                <a:ea typeface="Arial Unicode MS" panose="020B0604020202020204" pitchFamily="50" charset="-127"/>
+                <a:cs typeface="Arial" panose="020B0604020202020204" pitchFamily="34" charset="0"/>
+              </a:defRPr>
+            </a:lvl3pPr>
+            <a:lvl4pPr marL="1600200" indent="-228600">
+              <a:spcBef>
+                <a:spcPct val="20000"/>
+              </a:spcBef>
+              <a:buChar char="–"/>
+              <a:defRPr sz="2000">
+                <a:solidFill>
+                  <a:schemeClr val="tx1"/>
+                </a:solidFill>
+                <a:latin typeface="Arial" panose="020B0604020202020204" pitchFamily="34" charset="0"/>
+                <a:ea typeface="Arial Unicode MS" panose="020B0604020202020204" pitchFamily="50" charset="-127"/>
+                <a:cs typeface="Arial" panose="020B0604020202020204" pitchFamily="34" charset="0"/>
+              </a:defRPr>
+            </a:lvl4pPr>
+            <a:lvl5pPr marL="2057400" indent="-228600">
+              <a:spcBef>
+                <a:spcPct val="20000"/>
+              </a:spcBef>
+              <a:buChar char="»"/>
+              <a:defRPr sz="2000">
+                <a:solidFill>
+                  <a:schemeClr val="tx1"/>
+                </a:solidFill>
+                <a:latin typeface="Arial" panose="020B0604020202020204" pitchFamily="34" charset="0"/>
+                <a:ea typeface="Arial Unicode MS" panose="020B0604020202020204" pitchFamily="50" charset="-127"/>
+                <a:cs typeface="Arial" panose="020B0604020202020204" pitchFamily="34" charset="0"/>
+              </a:defRPr>
+            </a:lvl5pPr>
+            <a:lvl6pPr marL="2514600" indent="-228600" eaLnBrk="0" fontAlgn="base" hangingPunct="0">
+              <a:spcBef>
+                <a:spcPct val="20000"/>
+              </a:spcBef>
+              <a:spcAft>
+                <a:spcPct val="0"/>
+              </a:spcAft>
+              <a:buChar char="»"/>
+              <a:defRPr sz="2000">
+                <a:solidFill>
+                  <a:schemeClr val="tx1"/>
+                </a:solidFill>
+                <a:latin typeface="Arial" panose="020B0604020202020204" pitchFamily="34" charset="0"/>
+                <a:ea typeface="Arial Unicode MS" panose="020B0604020202020204" pitchFamily="50" charset="-127"/>
+                <a:cs typeface="Arial" panose="020B0604020202020204" pitchFamily="34" charset="0"/>
+              </a:defRPr>
+            </a:lvl6pPr>
+            <a:lvl7pPr marL="2971800" indent="-228600" eaLnBrk="0" fontAlgn="base" hangingPunct="0">
+              <a:spcBef>
+                <a:spcPct val="20000"/>
+              </a:spcBef>
+              <a:spcAft>
+                <a:spcPct val="0"/>
+              </a:spcAft>
+              <a:buChar char="»"/>
+              <a:defRPr sz="2000">
+                <a:solidFill>
+                  <a:schemeClr val="tx1"/>
+                </a:solidFill>
+                <a:latin typeface="Arial" panose="020B0604020202020204" pitchFamily="34" charset="0"/>
+                <a:ea typeface="Arial Unicode MS" panose="020B0604020202020204" pitchFamily="50" charset="-127"/>
+                <a:cs typeface="Arial" panose="020B0604020202020204" pitchFamily="34" charset="0"/>
+              </a:defRPr>
+            </a:lvl7pPr>
+            <a:lvl8pPr marL="3429000" indent="-228600" eaLnBrk="0" fontAlgn="base" hangingPunct="0">
+              <a:spcBef>
+                <a:spcPct val="20000"/>
+              </a:spcBef>
+              <a:spcAft>
+                <a:spcPct val="0"/>
+              </a:spcAft>
+              <a:buChar char="»"/>
+              <a:defRPr sz="2000">
+                <a:solidFill>
+                  <a:schemeClr val="tx1"/>
+                </a:solidFill>
+                <a:latin typeface="Arial" panose="020B0604020202020204" pitchFamily="34" charset="0"/>
+                <a:ea typeface="Arial Unicode MS" panose="020B0604020202020204" pitchFamily="50" charset="-127"/>
+                <a:cs typeface="Arial" panose="020B0604020202020204" pitchFamily="34" charset="0"/>
+              </a:defRPr>
+            </a:lvl8pPr>
+            <a:lvl9pPr marL="3886200" indent="-228600" eaLnBrk="0" fontAlgn="base" hangingPunct="0">
+              <a:spcBef>
+                <a:spcPct val="20000"/>
+              </a:spcBef>
+              <a:spcAft>
+                <a:spcPct val="0"/>
+              </a:spcAft>
+              <a:buChar char="»"/>
+              <a:defRPr sz="2000">
+                <a:solidFill>
+                  <a:schemeClr val="tx1"/>
+                </a:solidFill>
+                <a:latin typeface="Arial" panose="020B0604020202020204" pitchFamily="34" charset="0"/>
+                <a:ea typeface="Arial Unicode MS" panose="020B0604020202020204" pitchFamily="50" charset="-127"/>
+                <a:cs typeface="Arial" panose="020B0604020202020204" pitchFamily="34" charset="0"/>
+              </a:defRPr>
+            </a:lvl9pPr>
+          </a:lstStyle>
+          <a:p>
+            <a:pPr algn="l">
+              <a:buNone/>
+            </a:pPr>
+            <a:r>
+              <a:rPr lang="ko-KR" altLang="en-US" sz="1800" b="1" i="0">
+                <a:solidFill>
+                  <a:srgbClr val="24292F"/>
+                </a:solidFill>
+                <a:effectLst/>
+                <a:latin typeface="맑은 고딕" panose="020B0503020000020004" pitchFamily="50" charset="-127"/>
+                <a:ea typeface="맑은 고딕" panose="020B0503020000020004" pitchFamily="50" charset="-127"/>
+              </a:rPr>
+              <a:t>인라인 캐싱</a:t>
+            </a:r>
+            <a:br>
+              <a:rPr lang="en-US" altLang="ko-KR" sz="1400" i="0">
+                <a:solidFill>
+                  <a:srgbClr val="24292F"/>
+                </a:solidFill>
+                <a:effectLst/>
+                <a:latin typeface="맑은 고딕" panose="020B0503020000020004" pitchFamily="50" charset="-127"/>
+                <a:ea typeface="맑은 고딕" panose="020B0503020000020004" pitchFamily="50" charset="-127"/>
+              </a:rPr>
+            </a:br>
+            <a:br>
+              <a:rPr lang="en-US" altLang="ko-KR" sz="1400" i="0">
+                <a:solidFill>
+                  <a:srgbClr val="24292F"/>
+                </a:solidFill>
+                <a:effectLst/>
+                <a:latin typeface="맑은 고딕" panose="020B0503020000020004" pitchFamily="50" charset="-127"/>
+                <a:ea typeface="맑은 고딕" panose="020B0503020000020004" pitchFamily="50" charset="-127"/>
+              </a:rPr>
+            </a:br>
+            <a:r>
+              <a:rPr lang="ko-KR" altLang="en-US" sz="1400" b="0" i="0">
+                <a:solidFill>
+                  <a:schemeClr val="bg2"/>
+                </a:solidFill>
+                <a:effectLst/>
+                <a:latin typeface="맑은 고딕" panose="020B0503020000020004" pitchFamily="50" charset="-127"/>
+                <a:ea typeface="맑은 고딕" panose="020B0503020000020004" pitchFamily="50" charset="-127"/>
+              </a:rPr>
+              <a:t>임의의 객체에 조회를 한 번 수행한 다음 </a:t>
+            </a:r>
+            <a:br>
+              <a:rPr lang="en-US" altLang="ko-KR" sz="1400" b="0" i="0">
+                <a:solidFill>
+                  <a:schemeClr val="bg2"/>
+                </a:solidFill>
+                <a:effectLst/>
+                <a:latin typeface="맑은 고딕" panose="020B0503020000020004" pitchFamily="50" charset="-127"/>
+                <a:ea typeface="맑은 고딕" panose="020B0503020000020004" pitchFamily="50" charset="-127"/>
+              </a:rPr>
+            </a:br>
+            <a:r>
+              <a:rPr lang="ko-KR" altLang="en-US" sz="1400" b="0" i="0">
+                <a:solidFill>
+                  <a:schemeClr val="bg2"/>
+                </a:solidFill>
+                <a:effectLst/>
+                <a:latin typeface="맑은 고딕" panose="020B0503020000020004" pitchFamily="50" charset="-127"/>
+                <a:ea typeface="맑은 고딕" panose="020B0503020000020004" pitchFamily="50" charset="-127"/>
+              </a:rPr>
+              <a:t>객체의 호출 모양을 키로 사용하여 캐시에 이 속성의 경로를 넣는 것이다</a:t>
+            </a:r>
+            <a:r>
+              <a:rPr lang="en-US" altLang="ko-KR" sz="1400" b="0" i="0">
+                <a:solidFill>
+                  <a:schemeClr val="bg2"/>
+                </a:solidFill>
+                <a:effectLst/>
+                <a:latin typeface="맑은 고딕" panose="020B0503020000020004" pitchFamily="50" charset="-127"/>
+                <a:ea typeface="맑은 고딕" panose="020B0503020000020004" pitchFamily="50" charset="-127"/>
+              </a:rPr>
+              <a:t>.</a:t>
+            </a:r>
+          </a:p>
+        </p:txBody>
+      </p:sp>
+      <p:pic>
+        <p:nvPicPr>
+          <p:cNvPr id="17" name="그림 16">
+            <a:extLst>
+              <a:ext uri="{FF2B5EF4-FFF2-40B4-BE49-F238E27FC236}">
+                <a16:creationId xmlns:a16="http://schemas.microsoft.com/office/drawing/2014/main" id="{4DFD43C7-8690-4300-931E-54C3E4B05914}"/>
+              </a:ext>
+            </a:extLst>
+          </p:cNvPr>
+          <p:cNvPicPr>
+            <a:picLocks noChangeAspect="1"/>
+          </p:cNvPicPr>
+          <p:nvPr/>
+        </p:nvPicPr>
+        <p:blipFill>
+          <a:blip r:embed="rId5"/>
+          <a:stretch>
+            <a:fillRect/>
+          </a:stretch>
+        </p:blipFill>
+        <p:spPr>
+          <a:xfrm>
+            <a:off x="761028" y="4066231"/>
+            <a:ext cx="7283702" cy="2722750"/>
+          </a:xfrm>
+          <a:prstGeom prst="rect">
+            <a:avLst/>
+          </a:prstGeom>
+        </p:spPr>
+      </p:pic>
     </p:spTree>
     <p:extLst>
       <p:ext uri="{BB962C8B-B14F-4D97-AF65-F5344CB8AC3E}">
@@ -11003,7 +11391,7 @@
                                           </p:stCondLst>
                                         </p:cTn>
                                         <p:tgtEl>
-                                          <p:spTgt spid="16"/>
+                                          <p:spTgt spid="15"/>
                                         </p:tgtEl>
                                         <p:attrNameLst>
                                           <p:attrName>style.visibility</p:attrName>
@@ -11030,7 +11418,7 @@
                                           </p:stCondLst>
                                         </p:cTn>
                                         <p:tgtEl>
-                                          <p:spTgt spid="7"/>
+                                          <p:spTgt spid="5"/>
                                         </p:tgtEl>
                                         <p:attrNameLst>
                                           <p:attrName>style.visibility</p:attrName>
@@ -11057,7 +11445,7 @@
                                           </p:stCondLst>
                                         </p:cTn>
                                         <p:tgtEl>
-                                          <p:spTgt spid="9"/>
+                                          <p:spTgt spid="14"/>
                                         </p:tgtEl>
                                         <p:attrNameLst>
                                           <p:attrName>style.visibility</p:attrName>
@@ -11084,7 +11472,7 @@
                                           </p:stCondLst>
                                         </p:cTn>
                                         <p:tgtEl>
-                                          <p:spTgt spid="11"/>
+                                          <p:spTgt spid="12"/>
                                         </p:tgtEl>
                                         <p:attrNameLst>
                                           <p:attrName>style.visibility</p:attrName>
@@ -11129,7 +11517,7 @@
                                           </p:stCondLst>
                                         </p:cTn>
                                         <p:tgtEl>
-                                          <p:spTgt spid="15"/>
+                                          <p:spTgt spid="13"/>
                                         </p:tgtEl>
                                         <p:attrNameLst>
                                           <p:attrName>style.visibility</p:attrName>
@@ -11142,21 +11530,39 @@
                                   </p:childTnLst>
                                 </p:cTn>
                               </p:par>
+                            </p:childTnLst>
+                          </p:cTn>
+                        </p:par>
+                      </p:childTnLst>
+                    </p:cTn>
+                  </p:par>
+                  <p:par>
+                    <p:cTn id="17" fill="hold">
+                      <p:stCondLst>
+                        <p:cond delay="indefinite"/>
+                      </p:stCondLst>
+                      <p:childTnLst>
+                        <p:par>
+                          <p:cTn id="18" fill="hold">
+                            <p:stCondLst>
+                              <p:cond delay="0"/>
+                            </p:stCondLst>
+                            <p:childTnLst>
                               <p:par>
-                                <p:cTn id="17" presetID="1" presetClass="entr" presetSubtype="0" fill="hold" nodeType="withEffect">
+                                <p:cTn id="19" presetID="1" presetClass="entr" presetSubtype="0" fill="hold" grpId="0" nodeType="clickEffect">
                                   <p:stCondLst>
                                     <p:cond delay="0"/>
                                   </p:stCondLst>
                                   <p:childTnLst>
                                     <p:set>
                                       <p:cBhvr>
-                                        <p:cTn id="18" dur="1" fill="hold">
+                                        <p:cTn id="20" dur="1" fill="hold">
                                           <p:stCondLst>
                                             <p:cond delay="0"/>
                                           </p:stCondLst>
                                         </p:cTn>
                                         <p:tgtEl>
-                                          <p:spTgt spid="5"/>
+                                          <p:spTgt spid="18"/>
                                         </p:tgtEl>
                                         <p:attrNameLst>
                                           <p:attrName>style.visibility</p:attrName>
@@ -11169,48 +11575,39 @@
                                   </p:childTnLst>
                                 </p:cTn>
                               </p:par>
+                            </p:childTnLst>
+                          </p:cTn>
+                        </p:par>
+                      </p:childTnLst>
+                    </p:cTn>
+                  </p:par>
+                  <p:par>
+                    <p:cTn id="21" fill="hold">
+                      <p:stCondLst>
+                        <p:cond delay="indefinite"/>
+                      </p:stCondLst>
+                      <p:childTnLst>
+                        <p:par>
+                          <p:cTn id="22" fill="hold">
+                            <p:stCondLst>
+                              <p:cond delay="0"/>
+                            </p:stCondLst>
+                            <p:childTnLst>
                               <p:par>
-                                <p:cTn id="19" presetID="1" presetClass="entr" presetSubtype="0" fill="hold" nodeType="withEffect">
+                                <p:cTn id="23" presetID="1" presetClass="entr" presetSubtype="0" fill="hold" nodeType="clickEffect">
                                   <p:stCondLst>
                                     <p:cond delay="0"/>
                                   </p:stCondLst>
                                   <p:childTnLst>
                                     <p:set>
                                       <p:cBhvr>
-                                        <p:cTn id="20" dur="1" fill="hold">
+                                        <p:cTn id="24" dur="1" fill="hold">
                                           <p:stCondLst>
                                             <p:cond delay="0"/>
                                           </p:stCondLst>
                                         </p:cTn>
                                         <p:tgtEl>
-                                          <p:spTgt spid="14"/>
-                                        </p:tgtEl>
-                                        <p:attrNameLst>
-                                          <p:attrName>style.visibility</p:attrName>
-                                        </p:attrNameLst>
-                                      </p:cBhvr>
-                                      <p:to>
-                                        <p:strVal val="visible"/>
-                                      </p:to>
-                                    </p:set>
-                                  </p:childTnLst>
-                                </p:cTn>
-                              </p:par>
-                              <p:par>
-                                <p:cTn id="21" presetID="1" presetClass="entr" presetSubtype="0" fill="hold" grpId="0" nodeType="withEffect">
-                                  <p:stCondLst>
-                                    <p:cond delay="0"/>
-                                  </p:stCondLst>
-                                  <p:childTnLst>
-                                    <p:set>
-                                      <p:cBhvr>
-                                        <p:cTn id="22" dur="1" fill="hold">
-                                          <p:stCondLst>
-                                            <p:cond delay="0"/>
-                                          </p:stCondLst>
-                                        </p:cTn>
-                                        <p:tgtEl>
-                                          <p:spTgt spid="12"/>
+                                          <p:spTgt spid="17"/>
                                         </p:tgtEl>
                                         <p:attrNameLst>
                                           <p:attrName>style.visibility</p:attrName>
@@ -11251,889 +11648,10 @@
       </p:par>
     </p:tnLst>
     <p:bldLst>
-      <p:bldP spid="11" grpId="0"/>
       <p:bldP spid="12" grpId="0"/>
       <p:bldP spid="15" grpId="0"/>
-      <p:bldP spid="16" grpId="0"/>
-    </p:bldLst>
-  </p:timing>
-</p:sld>
-</file>
-
-<file path=ppt/slides/slide17.xml><?xml version="1.0" encoding="utf-8"?>
-<p:sld xmlns:a="http://schemas.openxmlformats.org/drawingml/2006/main" xmlns:r="http://schemas.openxmlformats.org/officeDocument/2006/relationships" xmlns:p="http://schemas.openxmlformats.org/presentationml/2006/main">
-  <p:cSld>
-    <p:spTree>
-      <p:nvGrpSpPr>
-        <p:cNvPr id="1" name=""/>
-        <p:cNvGrpSpPr/>
-        <p:nvPr/>
-      </p:nvGrpSpPr>
-      <p:grpSpPr>
-        <a:xfrm>
-          <a:off x="0" y="0"/>
-          <a:ext cx="0" cy="0"/>
-          <a:chOff x="0" y="0"/>
-          <a:chExt cx="0" cy="0"/>
-        </a:xfrm>
-      </p:grpSpPr>
-      <p:sp>
-        <p:nvSpPr>
-          <p:cNvPr id="5122" name="Rectangle 2">
-            <a:extLst>
-              <a:ext uri="{FF2B5EF4-FFF2-40B4-BE49-F238E27FC236}">
-                <a16:creationId xmlns:a16="http://schemas.microsoft.com/office/drawing/2014/main" id="{5A5441BC-21C9-4C4E-8617-73A39EC832C7}"/>
-              </a:ext>
-            </a:extLst>
-          </p:cNvPr>
-          <p:cNvSpPr>
-            <a:spLocks noGrp="1" noChangeArrowheads="1"/>
-          </p:cNvSpPr>
-          <p:nvPr>
-            <p:ph type="title"/>
-          </p:nvPr>
-        </p:nvSpPr>
-        <p:spPr>
-          <a:xfrm>
-            <a:off x="457200" y="188913"/>
-            <a:ext cx="8229600" cy="1295400"/>
-          </a:xfrm>
-        </p:spPr>
-        <p:txBody>
-          <a:bodyPr/>
-          <a:lstStyle/>
-          <a:p>
-            <a:pPr algn="l" eaLnBrk="1" hangingPunct="1">
-              <a:defRPr/>
-            </a:pPr>
-            <a:r>
-              <a:rPr lang="en-US" altLang="ko-KR" sz="3200">
-                <a:solidFill>
-                  <a:schemeClr val="tx1"/>
-                </a:solidFill>
-              </a:rPr>
-              <a:t>JS </a:t>
-            </a:r>
-            <a:r>
-              <a:rPr lang="ko-KR" altLang="en-US" sz="3200">
-                <a:solidFill>
-                  <a:schemeClr val="tx1"/>
-                </a:solidFill>
-              </a:rPr>
-              <a:t>배열 내부 자료구조의 변형</a:t>
-            </a:r>
-            <a:endParaRPr lang="ko-KR" altLang="ko-KR" sz="2000">
-              <a:solidFill>
-                <a:schemeClr val="tx1"/>
-              </a:solidFill>
-            </a:endParaRPr>
-          </a:p>
-        </p:txBody>
-      </p:sp>
-      <p:cxnSp>
-        <p:nvCxnSpPr>
-          <p:cNvPr id="3" name="직선 연결선 2">
-            <a:extLst>
-              <a:ext uri="{FF2B5EF4-FFF2-40B4-BE49-F238E27FC236}">
-                <a16:creationId xmlns:a16="http://schemas.microsoft.com/office/drawing/2014/main" id="{00016A16-78F9-4CDB-B5A3-E7D1D56285D2}"/>
-              </a:ext>
-            </a:extLst>
-          </p:cNvPr>
-          <p:cNvCxnSpPr/>
-          <p:nvPr/>
-        </p:nvCxnSpPr>
-        <p:spPr bwMode="auto">
-          <a:xfrm>
-            <a:off x="575556" y="1268760"/>
-            <a:ext cx="7992888" cy="0"/>
-          </a:xfrm>
-          <a:prstGeom prst="line">
-            <a:avLst/>
-          </a:prstGeom>
-          <a:solidFill>
-            <a:schemeClr val="accent1"/>
-          </a:solidFill>
-          <a:ln w="25400" cap="flat" cmpd="sng" algn="ctr">
-            <a:solidFill>
-              <a:schemeClr val="tx1"/>
-            </a:solidFill>
-            <a:prstDash val="solid"/>
-            <a:round/>
-            <a:headEnd type="none" w="med" len="med"/>
-            <a:tailEnd type="none" w="med" len="med"/>
-          </a:ln>
-          <a:effectLst/>
-          <a:extLst>
-            <a:ext uri="{AF507438-7753-43E0-B8FC-AC1667EBCBE1}">
-              <a14:hiddenEffects xmlns:a14="http://schemas.microsoft.com/office/drawing/2010/main">
-                <a:effectLst>
-                  <a:outerShdw dist="35921" dir="2700000" algn="ctr" rotWithShape="0">
-                    <a:schemeClr val="bg2"/>
-                  </a:outerShdw>
-                </a:effectLst>
-              </a14:hiddenEffects>
-            </a:ext>
-          </a:extLst>
-        </p:spPr>
-      </p:cxnSp>
-      <p:sp>
-        <p:nvSpPr>
-          <p:cNvPr id="6" name="TextBox 5">
-            <a:extLst>
-              <a:ext uri="{FF2B5EF4-FFF2-40B4-BE49-F238E27FC236}">
-                <a16:creationId xmlns:a16="http://schemas.microsoft.com/office/drawing/2014/main" id="{0040CA95-FEE2-4C6C-AF06-A377B3B89826}"/>
-              </a:ext>
-            </a:extLst>
-          </p:cNvPr>
-          <p:cNvSpPr txBox="1">
-            <a:spLocks noChangeArrowheads="1"/>
-          </p:cNvSpPr>
-          <p:nvPr/>
-        </p:nvSpPr>
-        <p:spPr bwMode="auto">
-          <a:xfrm>
-            <a:off x="457200" y="1360645"/>
-            <a:ext cx="8090656" cy="1058751"/>
-          </a:xfrm>
-          <a:prstGeom prst="rect">
-            <a:avLst/>
-          </a:prstGeom>
-          <a:noFill/>
-          <a:ln>
-            <a:noFill/>
-          </a:ln>
-          <a:extLst>
-            <a:ext uri="{909E8E84-426E-40DD-AFC4-6F175D3DCCD1}">
-              <a14:hiddenFill xmlns:a14="http://schemas.microsoft.com/office/drawing/2010/main">
-                <a:solidFill>
-                  <a:srgbClr val="FFFFFF"/>
-                </a:solidFill>
-              </a14:hiddenFill>
-            </a:ext>
-            <a:ext uri="{91240B29-F687-4F45-9708-019B960494DF}">
-              <a14:hiddenLine xmlns:a14="http://schemas.microsoft.com/office/drawing/2010/main" w="9525">
-                <a:solidFill>
-                  <a:srgbClr val="000000"/>
-                </a:solidFill>
-                <a:miter lim="800000"/>
-                <a:headEnd/>
-                <a:tailEnd/>
-              </a14:hiddenLine>
-            </a:ext>
-          </a:extLst>
-        </p:spPr>
-        <p:txBody>
-          <a:bodyPr wrap="square">
-            <a:spAutoFit/>
-          </a:bodyPr>
-          <a:lstStyle>
-            <a:lvl1pPr>
-              <a:spcBef>
-                <a:spcPct val="20000"/>
-              </a:spcBef>
-              <a:buChar char="•"/>
-              <a:defRPr sz="3200">
-                <a:solidFill>
-                  <a:schemeClr val="tx1"/>
-                </a:solidFill>
-                <a:latin typeface="Arial" panose="020B0604020202020204" pitchFamily="34" charset="0"/>
-                <a:ea typeface="Arial Unicode MS" panose="020B0604020202020204" pitchFamily="50" charset="-127"/>
-                <a:cs typeface="Arial" panose="020B0604020202020204" pitchFamily="34" charset="0"/>
-              </a:defRPr>
-            </a:lvl1pPr>
-            <a:lvl2pPr marL="742950" indent="-285750">
-              <a:spcBef>
-                <a:spcPct val="20000"/>
-              </a:spcBef>
-              <a:buChar char="–"/>
-              <a:defRPr sz="2800">
-                <a:solidFill>
-                  <a:schemeClr val="tx1"/>
-                </a:solidFill>
-                <a:latin typeface="Arial" panose="020B0604020202020204" pitchFamily="34" charset="0"/>
-                <a:ea typeface="Arial Unicode MS" panose="020B0604020202020204" pitchFamily="50" charset="-127"/>
-                <a:cs typeface="Arial" panose="020B0604020202020204" pitchFamily="34" charset="0"/>
-              </a:defRPr>
-            </a:lvl2pPr>
-            <a:lvl3pPr marL="1143000" indent="-228600">
-              <a:spcBef>
-                <a:spcPct val="20000"/>
-              </a:spcBef>
-              <a:buChar char="•"/>
-              <a:defRPr sz="2400">
-                <a:solidFill>
-                  <a:schemeClr val="tx1"/>
-                </a:solidFill>
-                <a:latin typeface="Arial" panose="020B0604020202020204" pitchFamily="34" charset="0"/>
-                <a:ea typeface="Arial Unicode MS" panose="020B0604020202020204" pitchFamily="50" charset="-127"/>
-                <a:cs typeface="Arial" panose="020B0604020202020204" pitchFamily="34" charset="0"/>
-              </a:defRPr>
-            </a:lvl3pPr>
-            <a:lvl4pPr marL="1600200" indent="-228600">
-              <a:spcBef>
-                <a:spcPct val="20000"/>
-              </a:spcBef>
-              <a:buChar char="–"/>
-              <a:defRPr sz="2000">
-                <a:solidFill>
-                  <a:schemeClr val="tx1"/>
-                </a:solidFill>
-                <a:latin typeface="Arial" panose="020B0604020202020204" pitchFamily="34" charset="0"/>
-                <a:ea typeface="Arial Unicode MS" panose="020B0604020202020204" pitchFamily="50" charset="-127"/>
-                <a:cs typeface="Arial" panose="020B0604020202020204" pitchFamily="34" charset="0"/>
-              </a:defRPr>
-            </a:lvl4pPr>
-            <a:lvl5pPr marL="2057400" indent="-228600">
-              <a:spcBef>
-                <a:spcPct val="20000"/>
-              </a:spcBef>
-              <a:buChar char="»"/>
-              <a:defRPr sz="2000">
-                <a:solidFill>
-                  <a:schemeClr val="tx1"/>
-                </a:solidFill>
-                <a:latin typeface="Arial" panose="020B0604020202020204" pitchFamily="34" charset="0"/>
-                <a:ea typeface="Arial Unicode MS" panose="020B0604020202020204" pitchFamily="50" charset="-127"/>
-                <a:cs typeface="Arial" panose="020B0604020202020204" pitchFamily="34" charset="0"/>
-              </a:defRPr>
-            </a:lvl5pPr>
-            <a:lvl6pPr marL="2514600" indent="-228600" eaLnBrk="0" fontAlgn="base" hangingPunct="0">
-              <a:spcBef>
-                <a:spcPct val="20000"/>
-              </a:spcBef>
-              <a:spcAft>
-                <a:spcPct val="0"/>
-              </a:spcAft>
-              <a:buChar char="»"/>
-              <a:defRPr sz="2000">
-                <a:solidFill>
-                  <a:schemeClr val="tx1"/>
-                </a:solidFill>
-                <a:latin typeface="Arial" panose="020B0604020202020204" pitchFamily="34" charset="0"/>
-                <a:ea typeface="Arial Unicode MS" panose="020B0604020202020204" pitchFamily="50" charset="-127"/>
-                <a:cs typeface="Arial" panose="020B0604020202020204" pitchFamily="34" charset="0"/>
-              </a:defRPr>
-            </a:lvl6pPr>
-            <a:lvl7pPr marL="2971800" indent="-228600" eaLnBrk="0" fontAlgn="base" hangingPunct="0">
-              <a:spcBef>
-                <a:spcPct val="20000"/>
-              </a:spcBef>
-              <a:spcAft>
-                <a:spcPct val="0"/>
-              </a:spcAft>
-              <a:buChar char="»"/>
-              <a:defRPr sz="2000">
-                <a:solidFill>
-                  <a:schemeClr val="tx1"/>
-                </a:solidFill>
-                <a:latin typeface="Arial" panose="020B0604020202020204" pitchFamily="34" charset="0"/>
-                <a:ea typeface="Arial Unicode MS" panose="020B0604020202020204" pitchFamily="50" charset="-127"/>
-                <a:cs typeface="Arial" panose="020B0604020202020204" pitchFamily="34" charset="0"/>
-              </a:defRPr>
-            </a:lvl7pPr>
-            <a:lvl8pPr marL="3429000" indent="-228600" eaLnBrk="0" fontAlgn="base" hangingPunct="0">
-              <a:spcBef>
-                <a:spcPct val="20000"/>
-              </a:spcBef>
-              <a:spcAft>
-                <a:spcPct val="0"/>
-              </a:spcAft>
-              <a:buChar char="»"/>
-              <a:defRPr sz="2000">
-                <a:solidFill>
-                  <a:schemeClr val="tx1"/>
-                </a:solidFill>
-                <a:latin typeface="Arial" panose="020B0604020202020204" pitchFamily="34" charset="0"/>
-                <a:ea typeface="Arial Unicode MS" panose="020B0604020202020204" pitchFamily="50" charset="-127"/>
-                <a:cs typeface="Arial" panose="020B0604020202020204" pitchFamily="34" charset="0"/>
-              </a:defRPr>
-            </a:lvl8pPr>
-            <a:lvl9pPr marL="3886200" indent="-228600" eaLnBrk="0" fontAlgn="base" hangingPunct="0">
-              <a:spcBef>
-                <a:spcPct val="20000"/>
-              </a:spcBef>
-              <a:spcAft>
-                <a:spcPct val="0"/>
-              </a:spcAft>
-              <a:buChar char="»"/>
-              <a:defRPr sz="2000">
-                <a:solidFill>
-                  <a:schemeClr val="tx1"/>
-                </a:solidFill>
-                <a:latin typeface="Arial" panose="020B0604020202020204" pitchFamily="34" charset="0"/>
-                <a:ea typeface="Arial Unicode MS" panose="020B0604020202020204" pitchFamily="50" charset="-127"/>
-                <a:cs typeface="Arial" panose="020B0604020202020204" pitchFamily="34" charset="0"/>
-              </a:defRPr>
-            </a:lvl9pPr>
-          </a:lstStyle>
-          <a:p>
-            <a:pPr algn="l">
-              <a:buNone/>
-            </a:pPr>
-            <a:r>
-              <a:rPr lang="ko-KR" altLang="en-US" sz="1800" b="1" i="0">
-                <a:solidFill>
-                  <a:srgbClr val="24292F"/>
-                </a:solidFill>
-                <a:effectLst/>
-                <a:latin typeface="맑은 고딕" panose="020B0503020000020004" pitchFamily="50" charset="-127"/>
-                <a:ea typeface="맑은 고딕" panose="020B0503020000020004" pitchFamily="50" charset="-127"/>
-              </a:rPr>
-              <a:t>실생활에 적용하기</a:t>
-            </a:r>
-            <a:br>
-              <a:rPr lang="en-US" altLang="ko-KR" sz="1400" i="0">
-                <a:solidFill>
-                  <a:srgbClr val="24292F"/>
-                </a:solidFill>
-                <a:effectLst/>
-                <a:latin typeface="맑은 고딕" panose="020B0503020000020004" pitchFamily="50" charset="-127"/>
-                <a:ea typeface="맑은 고딕" panose="020B0503020000020004" pitchFamily="50" charset="-127"/>
-              </a:rPr>
-            </a:br>
-            <a:br>
-              <a:rPr lang="en-US" altLang="ko-KR" sz="1400" i="0">
-                <a:solidFill>
-                  <a:srgbClr val="24292F"/>
-                </a:solidFill>
-                <a:effectLst/>
-                <a:latin typeface="맑은 고딕" panose="020B0503020000020004" pitchFamily="50" charset="-127"/>
-                <a:ea typeface="맑은 고딕" panose="020B0503020000020004" pitchFamily="50" charset="-127"/>
-              </a:rPr>
-            </a:br>
-            <a:r>
-              <a:rPr lang="en-US" altLang="ko-KR" sz="1400" i="0">
-                <a:solidFill>
-                  <a:srgbClr val="24292F"/>
-                </a:solidFill>
-                <a:effectLst/>
-                <a:latin typeface="맑은 고딕" panose="020B0503020000020004" pitchFamily="50" charset="-127"/>
-                <a:ea typeface="맑은 고딕" panose="020B0503020000020004" pitchFamily="50" charset="-127"/>
-              </a:rPr>
-              <a:t>4. </a:t>
-            </a:r>
-            <a:r>
-              <a:rPr lang="ko-KR" altLang="en-US" sz="1400" i="0">
-                <a:solidFill>
-                  <a:srgbClr val="24292F"/>
-                </a:solidFill>
-                <a:effectLst/>
-                <a:latin typeface="맑은 고딕" panose="020B0503020000020004" pitchFamily="50" charset="-127"/>
-                <a:ea typeface="맑은 고딕" panose="020B0503020000020004" pitchFamily="50" charset="-127"/>
-              </a:rPr>
-              <a:t>다형성 </a:t>
-            </a:r>
-            <a:r>
-              <a:rPr lang="en-US" altLang="ko-KR" sz="1400" i="0">
-                <a:solidFill>
-                  <a:srgbClr val="24292F"/>
-                </a:solidFill>
-                <a:effectLst/>
-                <a:latin typeface="맑은 고딕" panose="020B0503020000020004" pitchFamily="50" charset="-127"/>
-                <a:ea typeface="맑은 고딕" panose="020B0503020000020004" pitchFamily="50" charset="-127"/>
-              </a:rPr>
-              <a:t>(call site polymorphism)</a:t>
-            </a:r>
-            <a:r>
-              <a:rPr lang="ko-KR" altLang="en-US" sz="1400" i="0">
-                <a:solidFill>
-                  <a:srgbClr val="24292F"/>
-                </a:solidFill>
-                <a:effectLst/>
-                <a:latin typeface="맑은 고딕" panose="020B0503020000020004" pitchFamily="50" charset="-127"/>
-                <a:ea typeface="맑은 고딕" panose="020B0503020000020004" pitchFamily="50" charset="-127"/>
-              </a:rPr>
-              <a:t>을 피하자</a:t>
-            </a:r>
-            <a:r>
-              <a:rPr lang="en-US" altLang="ko-KR" sz="1400" i="0">
-                <a:solidFill>
-                  <a:srgbClr val="24292F"/>
-                </a:solidFill>
-                <a:effectLst/>
-                <a:latin typeface="맑은 고딕" panose="020B0503020000020004" pitchFamily="50" charset="-127"/>
-                <a:ea typeface="맑은 고딕" panose="020B0503020000020004" pitchFamily="50" charset="-127"/>
-              </a:rPr>
-              <a:t>.</a:t>
-            </a:r>
-          </a:p>
-          <a:p>
-            <a:pPr algn="l">
-              <a:buNone/>
-            </a:pPr>
-            <a:r>
-              <a:rPr lang="en-US" altLang="ko-KR" sz="1400">
-                <a:solidFill>
-                  <a:srgbClr val="24292F"/>
-                </a:solidFill>
-                <a:latin typeface="맑은 고딕" panose="020B0503020000020004" pitchFamily="50" charset="-127"/>
-                <a:ea typeface="맑은 고딕" panose="020B0503020000020004" pitchFamily="50" charset="-127"/>
-              </a:rPr>
-              <a:t>    </a:t>
-            </a:r>
-            <a:r>
-              <a:rPr lang="ko-KR" altLang="en-US" sz="1400">
-                <a:solidFill>
-                  <a:srgbClr val="24292F"/>
-                </a:solidFill>
-                <a:latin typeface="맑은 고딕" panose="020B0503020000020004" pitchFamily="50" charset="-127"/>
-                <a:ea typeface="맑은 고딕" panose="020B0503020000020004" pitchFamily="50" charset="-127"/>
-              </a:rPr>
-              <a:t>배열 빌트인 메서드는 요소가 같은 배열 요소를 처리할 때 인라인 캐싱이 더 빠르다</a:t>
-            </a:r>
-            <a:r>
-              <a:rPr lang="en-US" altLang="ko-KR" sz="1400">
-                <a:solidFill>
-                  <a:srgbClr val="24292F"/>
-                </a:solidFill>
-                <a:latin typeface="맑은 고딕" panose="020B0503020000020004" pitchFamily="50" charset="-127"/>
-                <a:ea typeface="맑은 고딕" panose="020B0503020000020004" pitchFamily="50" charset="-127"/>
-              </a:rPr>
-              <a:t>.</a:t>
-            </a:r>
-            <a:endParaRPr lang="ko-KR" altLang="en-US" sz="1400" i="0">
-              <a:solidFill>
-                <a:srgbClr val="24292F"/>
-              </a:solidFill>
-              <a:effectLst/>
-              <a:latin typeface="맑은 고딕" panose="020B0503020000020004" pitchFamily="50" charset="-127"/>
-              <a:ea typeface="맑은 고딕" panose="020B0503020000020004" pitchFamily="50" charset="-127"/>
-            </a:endParaRPr>
-          </a:p>
-        </p:txBody>
-      </p:sp>
-      <p:pic>
-        <p:nvPicPr>
-          <p:cNvPr id="5" name="그림 4">
-            <a:extLst>
-              <a:ext uri="{FF2B5EF4-FFF2-40B4-BE49-F238E27FC236}">
-                <a16:creationId xmlns:a16="http://schemas.microsoft.com/office/drawing/2014/main" id="{2CC2DD81-53E8-4B09-ABD1-E6C75D0BE315}"/>
-              </a:ext>
-            </a:extLst>
-          </p:cNvPr>
-          <p:cNvPicPr>
-            <a:picLocks noChangeAspect="1"/>
-          </p:cNvPicPr>
-          <p:nvPr/>
-        </p:nvPicPr>
-        <p:blipFill>
-          <a:blip r:embed="rId2"/>
-          <a:stretch>
-            <a:fillRect/>
-          </a:stretch>
-        </p:blipFill>
-        <p:spPr>
-          <a:xfrm>
-            <a:off x="755576" y="2634840"/>
-            <a:ext cx="6887072" cy="2574484"/>
-          </a:xfrm>
-          <a:prstGeom prst="rect">
-            <a:avLst/>
-          </a:prstGeom>
-        </p:spPr>
-      </p:pic>
-      <p:sp>
-        <p:nvSpPr>
-          <p:cNvPr id="9" name="TextBox 8">
-            <a:extLst>
-              <a:ext uri="{FF2B5EF4-FFF2-40B4-BE49-F238E27FC236}">
-                <a16:creationId xmlns:a16="http://schemas.microsoft.com/office/drawing/2014/main" id="{1CC1DAE0-9BF6-4D98-A5BA-A2178FDF524D}"/>
-              </a:ext>
-            </a:extLst>
-          </p:cNvPr>
-          <p:cNvSpPr txBox="1">
-            <a:spLocks noChangeArrowheads="1"/>
-          </p:cNvSpPr>
-          <p:nvPr/>
-        </p:nvSpPr>
-        <p:spPr bwMode="auto">
-          <a:xfrm>
-            <a:off x="544714" y="5394892"/>
-            <a:ext cx="8090656" cy="1015663"/>
-          </a:xfrm>
-          <a:prstGeom prst="rect">
-            <a:avLst/>
-          </a:prstGeom>
-          <a:noFill/>
-          <a:ln>
-            <a:noFill/>
-          </a:ln>
-          <a:extLst>
-            <a:ext uri="{909E8E84-426E-40DD-AFC4-6F175D3DCCD1}">
-              <a14:hiddenFill xmlns:a14="http://schemas.microsoft.com/office/drawing/2010/main">
-                <a:solidFill>
-                  <a:srgbClr val="FFFFFF"/>
-                </a:solidFill>
-              </a14:hiddenFill>
-            </a:ext>
-            <a:ext uri="{91240B29-F687-4F45-9708-019B960494DF}">
-              <a14:hiddenLine xmlns:a14="http://schemas.microsoft.com/office/drawing/2010/main" w="9525">
-                <a:solidFill>
-                  <a:srgbClr val="000000"/>
-                </a:solidFill>
-                <a:miter lim="800000"/>
-                <a:headEnd/>
-                <a:tailEnd/>
-              </a14:hiddenLine>
-            </a:ext>
-          </a:extLst>
-        </p:spPr>
-        <p:txBody>
-          <a:bodyPr wrap="square">
-            <a:spAutoFit/>
-          </a:bodyPr>
-          <a:lstStyle>
-            <a:lvl1pPr>
-              <a:spcBef>
-                <a:spcPct val="20000"/>
-              </a:spcBef>
-              <a:buChar char="•"/>
-              <a:defRPr sz="3200">
-                <a:solidFill>
-                  <a:schemeClr val="tx1"/>
-                </a:solidFill>
-                <a:latin typeface="Arial" panose="020B0604020202020204" pitchFamily="34" charset="0"/>
-                <a:ea typeface="Arial Unicode MS" panose="020B0604020202020204" pitchFamily="50" charset="-127"/>
-                <a:cs typeface="Arial" panose="020B0604020202020204" pitchFamily="34" charset="0"/>
-              </a:defRPr>
-            </a:lvl1pPr>
-            <a:lvl2pPr marL="742950" indent="-285750">
-              <a:spcBef>
-                <a:spcPct val="20000"/>
-              </a:spcBef>
-              <a:buChar char="–"/>
-              <a:defRPr sz="2800">
-                <a:solidFill>
-                  <a:schemeClr val="tx1"/>
-                </a:solidFill>
-                <a:latin typeface="Arial" panose="020B0604020202020204" pitchFamily="34" charset="0"/>
-                <a:ea typeface="Arial Unicode MS" panose="020B0604020202020204" pitchFamily="50" charset="-127"/>
-                <a:cs typeface="Arial" panose="020B0604020202020204" pitchFamily="34" charset="0"/>
-              </a:defRPr>
-            </a:lvl2pPr>
-            <a:lvl3pPr marL="1143000" indent="-228600">
-              <a:spcBef>
-                <a:spcPct val="20000"/>
-              </a:spcBef>
-              <a:buChar char="•"/>
-              <a:defRPr sz="2400">
-                <a:solidFill>
-                  <a:schemeClr val="tx1"/>
-                </a:solidFill>
-                <a:latin typeface="Arial" panose="020B0604020202020204" pitchFamily="34" charset="0"/>
-                <a:ea typeface="Arial Unicode MS" panose="020B0604020202020204" pitchFamily="50" charset="-127"/>
-                <a:cs typeface="Arial" panose="020B0604020202020204" pitchFamily="34" charset="0"/>
-              </a:defRPr>
-            </a:lvl3pPr>
-            <a:lvl4pPr marL="1600200" indent="-228600">
-              <a:spcBef>
-                <a:spcPct val="20000"/>
-              </a:spcBef>
-              <a:buChar char="–"/>
-              <a:defRPr sz="2000">
-                <a:solidFill>
-                  <a:schemeClr val="tx1"/>
-                </a:solidFill>
-                <a:latin typeface="Arial" panose="020B0604020202020204" pitchFamily="34" charset="0"/>
-                <a:ea typeface="Arial Unicode MS" panose="020B0604020202020204" pitchFamily="50" charset="-127"/>
-                <a:cs typeface="Arial" panose="020B0604020202020204" pitchFamily="34" charset="0"/>
-              </a:defRPr>
-            </a:lvl4pPr>
-            <a:lvl5pPr marL="2057400" indent="-228600">
-              <a:spcBef>
-                <a:spcPct val="20000"/>
-              </a:spcBef>
-              <a:buChar char="»"/>
-              <a:defRPr sz="2000">
-                <a:solidFill>
-                  <a:schemeClr val="tx1"/>
-                </a:solidFill>
-                <a:latin typeface="Arial" panose="020B0604020202020204" pitchFamily="34" charset="0"/>
-                <a:ea typeface="Arial Unicode MS" panose="020B0604020202020204" pitchFamily="50" charset="-127"/>
-                <a:cs typeface="Arial" panose="020B0604020202020204" pitchFamily="34" charset="0"/>
-              </a:defRPr>
-            </a:lvl5pPr>
-            <a:lvl6pPr marL="2514600" indent="-228600" eaLnBrk="0" fontAlgn="base" hangingPunct="0">
-              <a:spcBef>
-                <a:spcPct val="20000"/>
-              </a:spcBef>
-              <a:spcAft>
-                <a:spcPct val="0"/>
-              </a:spcAft>
-              <a:buChar char="»"/>
-              <a:defRPr sz="2000">
-                <a:solidFill>
-                  <a:schemeClr val="tx1"/>
-                </a:solidFill>
-                <a:latin typeface="Arial" panose="020B0604020202020204" pitchFamily="34" charset="0"/>
-                <a:ea typeface="Arial Unicode MS" panose="020B0604020202020204" pitchFamily="50" charset="-127"/>
-                <a:cs typeface="Arial" panose="020B0604020202020204" pitchFamily="34" charset="0"/>
-              </a:defRPr>
-            </a:lvl6pPr>
-            <a:lvl7pPr marL="2971800" indent="-228600" eaLnBrk="0" fontAlgn="base" hangingPunct="0">
-              <a:spcBef>
-                <a:spcPct val="20000"/>
-              </a:spcBef>
-              <a:spcAft>
-                <a:spcPct val="0"/>
-              </a:spcAft>
-              <a:buChar char="»"/>
-              <a:defRPr sz="2000">
-                <a:solidFill>
-                  <a:schemeClr val="tx1"/>
-                </a:solidFill>
-                <a:latin typeface="Arial" panose="020B0604020202020204" pitchFamily="34" charset="0"/>
-                <a:ea typeface="Arial Unicode MS" panose="020B0604020202020204" pitchFamily="50" charset="-127"/>
-                <a:cs typeface="Arial" panose="020B0604020202020204" pitchFamily="34" charset="0"/>
-              </a:defRPr>
-            </a:lvl7pPr>
-            <a:lvl8pPr marL="3429000" indent="-228600" eaLnBrk="0" fontAlgn="base" hangingPunct="0">
-              <a:spcBef>
-                <a:spcPct val="20000"/>
-              </a:spcBef>
-              <a:spcAft>
-                <a:spcPct val="0"/>
-              </a:spcAft>
-              <a:buChar char="»"/>
-              <a:defRPr sz="2000">
-                <a:solidFill>
-                  <a:schemeClr val="tx1"/>
-                </a:solidFill>
-                <a:latin typeface="Arial" panose="020B0604020202020204" pitchFamily="34" charset="0"/>
-                <a:ea typeface="Arial Unicode MS" panose="020B0604020202020204" pitchFamily="50" charset="-127"/>
-                <a:cs typeface="Arial" panose="020B0604020202020204" pitchFamily="34" charset="0"/>
-              </a:defRPr>
-            </a:lvl8pPr>
-            <a:lvl9pPr marL="3886200" indent="-228600" eaLnBrk="0" fontAlgn="base" hangingPunct="0">
-              <a:spcBef>
-                <a:spcPct val="20000"/>
-              </a:spcBef>
-              <a:spcAft>
-                <a:spcPct val="0"/>
-              </a:spcAft>
-              <a:buChar char="»"/>
-              <a:defRPr sz="2000">
-                <a:solidFill>
-                  <a:schemeClr val="tx1"/>
-                </a:solidFill>
-                <a:latin typeface="Arial" panose="020B0604020202020204" pitchFamily="34" charset="0"/>
-                <a:ea typeface="Arial Unicode MS" panose="020B0604020202020204" pitchFamily="50" charset="-127"/>
-                <a:cs typeface="Arial" panose="020B0604020202020204" pitchFamily="34" charset="0"/>
-              </a:defRPr>
-            </a:lvl9pPr>
-          </a:lstStyle>
-          <a:p>
-            <a:pPr algn="l">
-              <a:buNone/>
-            </a:pPr>
-            <a:r>
-              <a:rPr lang="ko-KR" altLang="en-US" sz="1800" b="1" i="0">
-                <a:solidFill>
-                  <a:srgbClr val="24292F"/>
-                </a:solidFill>
-                <a:effectLst/>
-                <a:latin typeface="맑은 고딕" panose="020B0503020000020004" pitchFamily="50" charset="-127"/>
-                <a:ea typeface="맑은 고딕" panose="020B0503020000020004" pitchFamily="50" charset="-127"/>
-              </a:rPr>
-              <a:t>인라인 캐싱</a:t>
-            </a:r>
-            <a:br>
-              <a:rPr lang="en-US" altLang="ko-KR" sz="1400" i="0">
-                <a:solidFill>
-                  <a:srgbClr val="24292F"/>
-                </a:solidFill>
-                <a:effectLst/>
-                <a:latin typeface="맑은 고딕" panose="020B0503020000020004" pitchFamily="50" charset="-127"/>
-                <a:ea typeface="맑은 고딕" panose="020B0503020000020004" pitchFamily="50" charset="-127"/>
-              </a:rPr>
-            </a:br>
-            <a:br>
-              <a:rPr lang="en-US" altLang="ko-KR" sz="1400" i="0">
-                <a:solidFill>
-                  <a:srgbClr val="24292F"/>
-                </a:solidFill>
-                <a:effectLst/>
-                <a:latin typeface="맑은 고딕" panose="020B0503020000020004" pitchFamily="50" charset="-127"/>
-                <a:ea typeface="맑은 고딕" panose="020B0503020000020004" pitchFamily="50" charset="-127"/>
-              </a:rPr>
-            </a:br>
-            <a:r>
-              <a:rPr lang="ko-KR" altLang="en-US" sz="1400" b="0" i="0">
-                <a:solidFill>
-                  <a:schemeClr val="bg2"/>
-                </a:solidFill>
-                <a:effectLst/>
-                <a:latin typeface="맑은 고딕" panose="020B0503020000020004" pitchFamily="50" charset="-127"/>
-                <a:ea typeface="맑은 고딕" panose="020B0503020000020004" pitchFamily="50" charset="-127"/>
-              </a:rPr>
-              <a:t>임의의 객체에 조회를 한 번 수행한 다음 </a:t>
-            </a:r>
-            <a:br>
-              <a:rPr lang="en-US" altLang="ko-KR" sz="1400" b="0" i="0">
-                <a:solidFill>
-                  <a:schemeClr val="bg2"/>
-                </a:solidFill>
-                <a:effectLst/>
-                <a:latin typeface="맑은 고딕" panose="020B0503020000020004" pitchFamily="50" charset="-127"/>
-                <a:ea typeface="맑은 고딕" panose="020B0503020000020004" pitchFamily="50" charset="-127"/>
-              </a:rPr>
-            </a:br>
-            <a:r>
-              <a:rPr lang="ko-KR" altLang="en-US" sz="1400" b="0" i="0">
-                <a:solidFill>
-                  <a:schemeClr val="bg2"/>
-                </a:solidFill>
-                <a:effectLst/>
-                <a:latin typeface="맑은 고딕" panose="020B0503020000020004" pitchFamily="50" charset="-127"/>
-                <a:ea typeface="맑은 고딕" panose="020B0503020000020004" pitchFamily="50" charset="-127"/>
-              </a:rPr>
-              <a:t>객체의 호출 모양을 키로 사용하여 캐시에 이 속성의 경로를 넣는 것이다</a:t>
-            </a:r>
-            <a:r>
-              <a:rPr lang="en-US" altLang="ko-KR" sz="1400" b="0" i="0">
-                <a:solidFill>
-                  <a:schemeClr val="bg2"/>
-                </a:solidFill>
-                <a:effectLst/>
-                <a:latin typeface="맑은 고딕" panose="020B0503020000020004" pitchFamily="50" charset="-127"/>
-                <a:ea typeface="맑은 고딕" panose="020B0503020000020004" pitchFamily="50" charset="-127"/>
-              </a:rPr>
-              <a:t>.</a:t>
-            </a:r>
-          </a:p>
-        </p:txBody>
-      </p:sp>
-    </p:spTree>
-    <p:extLst>
-      <p:ext uri="{BB962C8B-B14F-4D97-AF65-F5344CB8AC3E}">
-        <p14:creationId xmlns:p14="http://schemas.microsoft.com/office/powerpoint/2010/main" val="2569240321"/>
-      </p:ext>
-    </p:extLst>
-  </p:cSld>
-  <p:clrMapOvr>
-    <a:masterClrMapping/>
-  </p:clrMapOvr>
-  <p:timing>
-    <p:tnLst>
-      <p:par>
-        <p:cTn id="1" dur="indefinite" restart="never" nodeType="tmRoot">
-          <p:childTnLst>
-            <p:seq concurrent="1" nextAc="seek">
-              <p:cTn id="2" dur="indefinite" nodeType="mainSeq">
-                <p:childTnLst>
-                  <p:par>
-                    <p:cTn id="3" fill="hold">
-                      <p:stCondLst>
-                        <p:cond delay="indefinite"/>
-                      </p:stCondLst>
-                      <p:childTnLst>
-                        <p:par>
-                          <p:cTn id="4" fill="hold">
-                            <p:stCondLst>
-                              <p:cond delay="0"/>
-                            </p:stCondLst>
-                            <p:childTnLst>
-                              <p:par>
-                                <p:cTn id="5" presetID="1" presetClass="entr" presetSubtype="0" fill="hold" grpId="0" nodeType="clickEffect">
-                                  <p:stCondLst>
-                                    <p:cond delay="0"/>
-                                  </p:stCondLst>
-                                  <p:childTnLst>
-                                    <p:set>
-                                      <p:cBhvr>
-                                        <p:cTn id="6" dur="1" fill="hold">
-                                          <p:stCondLst>
-                                            <p:cond delay="0"/>
-                                          </p:stCondLst>
-                                        </p:cTn>
-                                        <p:tgtEl>
-                                          <p:spTgt spid="9"/>
-                                        </p:tgtEl>
-                                        <p:attrNameLst>
-                                          <p:attrName>style.visibility</p:attrName>
-                                        </p:attrNameLst>
-                                      </p:cBhvr>
-                                      <p:to>
-                                        <p:strVal val="visible"/>
-                                      </p:to>
-                                    </p:set>
-                                  </p:childTnLst>
-                                </p:cTn>
-                              </p:par>
-                            </p:childTnLst>
-                          </p:cTn>
-                        </p:par>
-                      </p:childTnLst>
-                    </p:cTn>
-                  </p:par>
-                  <p:par>
-                    <p:cTn id="7" fill="hold">
-                      <p:stCondLst>
-                        <p:cond delay="indefinite"/>
-                      </p:stCondLst>
-                      <p:childTnLst>
-                        <p:par>
-                          <p:cTn id="8" fill="hold">
-                            <p:stCondLst>
-                              <p:cond delay="0"/>
-                            </p:stCondLst>
-                            <p:childTnLst>
-                              <p:par>
-                                <p:cTn id="9" presetID="1" presetClass="entr" presetSubtype="0" fill="hold" nodeType="clickEffect">
-                                  <p:stCondLst>
-                                    <p:cond delay="0"/>
-                                  </p:stCondLst>
-                                  <p:childTnLst>
-                                    <p:set>
-                                      <p:cBhvr>
-                                        <p:cTn id="10" dur="1" fill="hold">
-                                          <p:stCondLst>
-                                            <p:cond delay="0"/>
-                                          </p:stCondLst>
-                                        </p:cTn>
-                                        <p:tgtEl>
-                                          <p:spTgt spid="5"/>
-                                        </p:tgtEl>
-                                        <p:attrNameLst>
-                                          <p:attrName>style.visibility</p:attrName>
-                                        </p:attrNameLst>
-                                      </p:cBhvr>
-                                      <p:to>
-                                        <p:strVal val="visible"/>
-                                      </p:to>
-                                    </p:set>
-                                  </p:childTnLst>
-                                </p:cTn>
-                              </p:par>
-                            </p:childTnLst>
-                          </p:cTn>
-                        </p:par>
-                      </p:childTnLst>
-                    </p:cTn>
-                  </p:par>
-                </p:childTnLst>
-              </p:cTn>
-              <p:prevCondLst>
-                <p:cond evt="onPrev" delay="0">
-                  <p:tgtEl>
-                    <p:sldTgt/>
-                  </p:tgtEl>
-                </p:cond>
-              </p:prevCondLst>
-              <p:nextCondLst>
-                <p:cond evt="onNext" delay="0">
-                  <p:tgtEl>
-                    <p:sldTgt/>
-                  </p:tgtEl>
-                </p:cond>
-              </p:nextCondLst>
-            </p:seq>
-          </p:childTnLst>
-        </p:cTn>
-      </p:par>
-    </p:tnLst>
-    <p:bldLst>
-      <p:bldP spid="9" grpId="0"/>
+      <p:bldP spid="13" grpId="0"/>
+      <p:bldP spid="18" grpId="0"/>
     </p:bldLst>
   </p:timing>
 </p:sld>
@@ -12186,20 +11704,12 @@
               <a:defRPr/>
             </a:pPr>
             <a:r>
-              <a:rPr lang="en-US" altLang="ko-KR" sz="3200">
-                <a:solidFill>
-                  <a:schemeClr val="tx1"/>
-                </a:solidFill>
-              </a:rPr>
-              <a:t>JS </a:t>
-            </a:r>
-            <a:r>
               <a:rPr lang="ko-KR" altLang="en-US" sz="3200">
                 <a:solidFill>
                   <a:schemeClr val="tx1"/>
                 </a:solidFill>
               </a:rPr>
-              <a:t>배열 내부 자료구조의 변형</a:t>
+              <a:t>실생활에 적용하기</a:t>
             </a:r>
             <a:endParaRPr lang="ko-KR" altLang="ko-KR" sz="2000">
               <a:solidFill>
@@ -12277,7 +11787,7 @@
         </p:blipFill>
         <p:spPr>
           <a:xfrm>
-            <a:off x="575556" y="2407339"/>
+            <a:off x="554633" y="1760306"/>
             <a:ext cx="5076564" cy="2179538"/>
           </a:xfrm>
           <a:prstGeom prst="rect">
@@ -12307,7 +11817,7 @@
         </p:blipFill>
         <p:spPr>
           <a:xfrm>
-            <a:off x="575556" y="5349661"/>
+            <a:off x="550357" y="4077072"/>
             <a:ext cx="7196664" cy="1295400"/>
           </a:xfrm>
           <a:prstGeom prst="rect">
@@ -12332,7 +11842,7 @@
         <p:spPr bwMode="auto">
           <a:xfrm>
             <a:off x="457200" y="1360645"/>
-            <a:ext cx="8090656" cy="800219"/>
+            <a:ext cx="8090656" cy="307777"/>
           </a:xfrm>
           <a:prstGeom prst="rect">
             <a:avLst/>
@@ -12509,37 +12019,6 @@
             <a:pPr algn="l">
               <a:buNone/>
             </a:pPr>
-            <a:r>
-              <a:rPr lang="ko-KR" altLang="en-US" sz="1800" b="1" i="0">
-                <a:solidFill>
-                  <a:srgbClr val="24292F"/>
-                </a:solidFill>
-                <a:effectLst/>
-                <a:latin typeface="맑은 고딕" panose="020B0503020000020004" pitchFamily="50" charset="-127"/>
-                <a:ea typeface="맑은 고딕" panose="020B0503020000020004" pitchFamily="50" charset="-127"/>
-              </a:rPr>
-              <a:t>실생활에 적용하기</a:t>
-            </a:r>
-            <a:br>
-              <a:rPr lang="en-US" altLang="ko-KR" sz="1400" i="0">
-                <a:solidFill>
-                  <a:srgbClr val="24292F"/>
-                </a:solidFill>
-                <a:effectLst/>
-                <a:latin typeface="맑은 고딕" panose="020B0503020000020004" pitchFamily="50" charset="-127"/>
-                <a:ea typeface="맑은 고딕" panose="020B0503020000020004" pitchFamily="50" charset="-127"/>
-              </a:rPr>
-            </a:br>
-            <a:br>
-              <a:rPr lang="en-US" altLang="ko-KR" sz="1400" i="0">
-                <a:solidFill>
-                  <a:srgbClr val="24292F"/>
-                </a:solidFill>
-                <a:effectLst/>
-                <a:latin typeface="맑은 고딕" panose="020B0503020000020004" pitchFamily="50" charset="-127"/>
-                <a:ea typeface="맑은 고딕" panose="020B0503020000020004" pitchFamily="50" charset="-127"/>
-              </a:rPr>
-            </a:br>
             <a:r>
               <a:rPr lang="ko-KR" altLang="en-US" sz="1400" i="0">
                 <a:solidFill>

</xml_diff>